<commit_message>
Modifica powerpoint,funzioni di costo
</commit_message>
<xml_diff>
--- a/PowerPoint/Optimal control strategies to prevent the hospital beds collapse during COVID-19 outbreak.pptx
+++ b/PowerPoint/Optimal control strategies to prevent the hospital beds collapse during COVID-19 outbreak.pptx
@@ -277,7 +277,7 @@
           <a:p>
             <a:fld id="{32F30997-0925-4C0B-8C7A-0B9D8E6111C4}" type="datetimeFigureOut">
               <a:rPr lang="it-IT" smtClean="0"/>
-              <a:t>18/02/2021</a:t>
+              <a:t>20/02/2021</a:t>
             </a:fld>
             <a:endParaRPr lang="it-IT"/>
           </a:p>
@@ -475,7 +475,7 @@
           <a:p>
             <a:fld id="{32F30997-0925-4C0B-8C7A-0B9D8E6111C4}" type="datetimeFigureOut">
               <a:rPr lang="it-IT" smtClean="0"/>
-              <a:t>18/02/2021</a:t>
+              <a:t>20/02/2021</a:t>
             </a:fld>
             <a:endParaRPr lang="it-IT"/>
           </a:p>
@@ -683,7 +683,7 @@
           <a:p>
             <a:fld id="{32F30997-0925-4C0B-8C7A-0B9D8E6111C4}" type="datetimeFigureOut">
               <a:rPr lang="it-IT" smtClean="0"/>
-              <a:t>18/02/2021</a:t>
+              <a:t>20/02/2021</a:t>
             </a:fld>
             <a:endParaRPr lang="it-IT"/>
           </a:p>
@@ -881,7 +881,7 @@
           <a:p>
             <a:fld id="{32F30997-0925-4C0B-8C7A-0B9D8E6111C4}" type="datetimeFigureOut">
               <a:rPr lang="it-IT" smtClean="0"/>
-              <a:t>18/02/2021</a:t>
+              <a:t>20/02/2021</a:t>
             </a:fld>
             <a:endParaRPr lang="it-IT"/>
           </a:p>
@@ -1156,7 +1156,7 @@
           <a:p>
             <a:fld id="{32F30997-0925-4C0B-8C7A-0B9D8E6111C4}" type="datetimeFigureOut">
               <a:rPr lang="it-IT" smtClean="0"/>
-              <a:t>18/02/2021</a:t>
+              <a:t>20/02/2021</a:t>
             </a:fld>
             <a:endParaRPr lang="it-IT"/>
           </a:p>
@@ -1421,7 +1421,7 @@
           <a:p>
             <a:fld id="{32F30997-0925-4C0B-8C7A-0B9D8E6111C4}" type="datetimeFigureOut">
               <a:rPr lang="it-IT" smtClean="0"/>
-              <a:t>18/02/2021</a:t>
+              <a:t>20/02/2021</a:t>
             </a:fld>
             <a:endParaRPr lang="it-IT"/>
           </a:p>
@@ -1833,7 +1833,7 @@
           <a:p>
             <a:fld id="{32F30997-0925-4C0B-8C7A-0B9D8E6111C4}" type="datetimeFigureOut">
               <a:rPr lang="it-IT" smtClean="0"/>
-              <a:t>18/02/2021</a:t>
+              <a:t>20/02/2021</a:t>
             </a:fld>
             <a:endParaRPr lang="it-IT"/>
           </a:p>
@@ -1974,7 +1974,7 @@
           <a:p>
             <a:fld id="{32F30997-0925-4C0B-8C7A-0B9D8E6111C4}" type="datetimeFigureOut">
               <a:rPr lang="it-IT" smtClean="0"/>
-              <a:t>18/02/2021</a:t>
+              <a:t>20/02/2021</a:t>
             </a:fld>
             <a:endParaRPr lang="it-IT"/>
           </a:p>
@@ -2087,7 +2087,7 @@
           <a:p>
             <a:fld id="{32F30997-0925-4C0B-8C7A-0B9D8E6111C4}" type="datetimeFigureOut">
               <a:rPr lang="it-IT" smtClean="0"/>
-              <a:t>18/02/2021</a:t>
+              <a:t>20/02/2021</a:t>
             </a:fld>
             <a:endParaRPr lang="it-IT"/>
           </a:p>
@@ -2398,7 +2398,7 @@
           <a:p>
             <a:fld id="{32F30997-0925-4C0B-8C7A-0B9D8E6111C4}" type="datetimeFigureOut">
               <a:rPr lang="it-IT" smtClean="0"/>
-              <a:t>18/02/2021</a:t>
+              <a:t>20/02/2021</a:t>
             </a:fld>
             <a:endParaRPr lang="it-IT"/>
           </a:p>
@@ -2686,7 +2686,7 @@
           <a:p>
             <a:fld id="{32F30997-0925-4C0B-8C7A-0B9D8E6111C4}" type="datetimeFigureOut">
               <a:rPr lang="it-IT" smtClean="0"/>
-              <a:t>18/02/2021</a:t>
+              <a:t>20/02/2021</a:t>
             </a:fld>
             <a:endParaRPr lang="it-IT"/>
           </a:p>
@@ -2927,7 +2927,7 @@
           <a:p>
             <a:fld id="{32F30997-0925-4C0B-8C7A-0B9D8E6111C4}" type="datetimeFigureOut">
               <a:rPr lang="it-IT" smtClean="0"/>
-              <a:t>18/02/2021</a:t>
+              <a:t>20/02/2021</a:t>
             </a:fld>
             <a:endParaRPr lang="it-IT"/>
           </a:p>
@@ -3473,33 +3473,1296 @@
           </a:p>
         </p:txBody>
       </p:sp>
-      <p:sp>
-        <p:nvSpPr>
-          <p:cNvPr id="3" name="Segnaposto contenuto 2">
-            <a:extLst>
-              <a:ext uri="{FF2B5EF4-FFF2-40B4-BE49-F238E27FC236}">
-                <a16:creationId xmlns:a16="http://schemas.microsoft.com/office/drawing/2014/main" id="{24450AA9-F64F-4BBA-AB21-A2066BDFBF1B}"/>
-              </a:ext>
-            </a:extLst>
-          </p:cNvPr>
-          <p:cNvSpPr>
-            <a:spLocks noGrp="1"/>
-          </p:cNvSpPr>
-          <p:nvPr>
-            <p:ph idx="1"/>
-          </p:nvPr>
-        </p:nvSpPr>
-        <p:spPr/>
-        <p:txBody>
-          <a:bodyPr>
-            <a:normAutofit/>
-          </a:bodyPr>
-          <a:lstStyle/>
-          <a:p>
-            <a:endParaRPr lang="it-IT" dirty="0"/>
-          </a:p>
-        </p:txBody>
-      </p:sp>
+      <mc:AlternateContent xmlns:mc="http://schemas.openxmlformats.org/markup-compatibility/2006">
+        <mc:Choice xmlns:a14="http://schemas.microsoft.com/office/drawing/2010/main" Requires="a14">
+          <p:sp>
+            <p:nvSpPr>
+              <p:cNvPr id="4" name="CasellaDiTesto 3">
+                <a:extLst>
+                  <a:ext uri="{FF2B5EF4-FFF2-40B4-BE49-F238E27FC236}">
+                    <a16:creationId xmlns:a16="http://schemas.microsoft.com/office/drawing/2014/main" id="{B1C80E1B-9F62-451F-90C7-D85C0CEF2FD9}"/>
+                  </a:ext>
+                </a:extLst>
+              </p:cNvPr>
+              <p:cNvSpPr txBox="1"/>
+              <p:nvPr/>
+            </p:nvSpPr>
+            <p:spPr>
+              <a:xfrm>
+                <a:off x="838200" y="1583879"/>
+                <a:ext cx="4783617" cy="5271187"/>
+              </a:xfrm>
+              <a:prstGeom prst="rect">
+                <a:avLst/>
+              </a:prstGeom>
+              <a:noFill/>
+            </p:spPr>
+            <p:txBody>
+              <a:bodyPr wrap="none" lIns="0" tIns="0" rIns="0" bIns="0" rtlCol="0">
+                <a:spAutoFit/>
+              </a:bodyPr>
+              <a:lstStyle/>
+              <a:p>
+                <a:pPr marL="342900" indent="-342900">
+                  <a:lnSpc>
+                    <a:spcPct val="200000"/>
+                  </a:lnSpc>
+                  <a:buFont typeface="Arial" panose="020B0604020202020204" pitchFamily="34" charset="0"/>
+                  <a:buChar char="•"/>
+                </a:pPr>
+                <a14:m>
+                  <m:oMath xmlns:m="http://schemas.openxmlformats.org/officeDocument/2006/math">
+                    <m:sSub>
+                      <m:sSubPr>
+                        <m:ctrlPr>
+                          <a:rPr lang="it-IT" sz="2000" b="0" i="1" smtClean="0">
+                            <a:latin typeface="Cambria Math" panose="02040503050406030204" pitchFamily="18" charset="0"/>
+                          </a:rPr>
+                        </m:ctrlPr>
+                      </m:sSubPr>
+                      <m:e>
+                        <m:r>
+                          <a:rPr lang="it-IT" sz="2000" b="0" i="1" smtClean="0">
+                            <a:latin typeface="Cambria Math" panose="02040503050406030204" pitchFamily="18" charset="0"/>
+                          </a:rPr>
+                          <m:t>𝐽</m:t>
+                        </m:r>
+                      </m:e>
+                      <m:sub>
+                        <m:r>
+                          <a:rPr lang="it-IT" sz="2000" b="0" i="1" smtClean="0">
+                            <a:latin typeface="Cambria Math" panose="02040503050406030204" pitchFamily="18" charset="0"/>
+                          </a:rPr>
+                          <m:t>1</m:t>
+                        </m:r>
+                      </m:sub>
+                    </m:sSub>
+                    <m:d>
+                      <m:dPr>
+                        <m:ctrlPr>
+                          <a:rPr lang="it-IT" sz="2000" b="0" i="1" smtClean="0">
+                            <a:latin typeface="Cambria Math" panose="02040503050406030204" pitchFamily="18" charset="0"/>
+                          </a:rPr>
+                        </m:ctrlPr>
+                      </m:dPr>
+                      <m:e>
+                        <m:r>
+                          <a:rPr lang="it-IT" sz="2000" b="0" i="1" smtClean="0">
+                            <a:latin typeface="Cambria Math" panose="02040503050406030204" pitchFamily="18" charset="0"/>
+                          </a:rPr>
+                          <m:t>𝑢</m:t>
+                        </m:r>
+                      </m:e>
+                    </m:d>
+                    <m:r>
+                      <a:rPr lang="it-IT" sz="2000" b="0" i="1" smtClean="0">
+                        <a:latin typeface="Cambria Math" panose="02040503050406030204" pitchFamily="18" charset="0"/>
+                      </a:rPr>
+                      <m:t>=</m:t>
+                    </m:r>
+                    <m:nary>
+                      <m:naryPr>
+                        <m:ctrlPr>
+                          <a:rPr lang="it-IT" sz="2000" i="1" smtClean="0">
+                            <a:latin typeface="Cambria Math" panose="02040503050406030204" pitchFamily="18" charset="0"/>
+                          </a:rPr>
+                        </m:ctrlPr>
+                      </m:naryPr>
+                      <m:sub>
+                        <m:r>
+                          <m:rPr>
+                            <m:brk m:alnAt="23"/>
+                          </m:rPr>
+                          <a:rPr lang="it-IT" sz="2000" b="0" i="1" smtClean="0">
+                            <a:latin typeface="Cambria Math" panose="02040503050406030204" pitchFamily="18" charset="0"/>
+                          </a:rPr>
+                          <m:t>0</m:t>
+                        </m:r>
+                      </m:sub>
+                      <m:sup>
+                        <m:sSub>
+                          <m:sSubPr>
+                            <m:ctrlPr>
+                              <a:rPr lang="it-IT" sz="2000" b="0" i="1" smtClean="0">
+                                <a:latin typeface="Cambria Math" panose="02040503050406030204" pitchFamily="18" charset="0"/>
+                              </a:rPr>
+                            </m:ctrlPr>
+                          </m:sSubPr>
+                          <m:e>
+                            <m:r>
+                              <a:rPr lang="it-IT" sz="2000" b="0" i="1" smtClean="0">
+                                <a:latin typeface="Cambria Math" panose="02040503050406030204" pitchFamily="18" charset="0"/>
+                              </a:rPr>
+                              <m:t>𝑡</m:t>
+                            </m:r>
+                          </m:e>
+                          <m:sub>
+                            <m:r>
+                              <a:rPr lang="it-IT" sz="2000" b="0" i="1" smtClean="0">
+                                <a:latin typeface="Cambria Math" panose="02040503050406030204" pitchFamily="18" charset="0"/>
+                              </a:rPr>
+                              <m:t>𝑓</m:t>
+                            </m:r>
+                          </m:sub>
+                        </m:sSub>
+                      </m:sup>
+                      <m:e>
+                        <m:sSub>
+                          <m:sSubPr>
+                            <m:ctrlPr>
+                              <a:rPr lang="it-IT" sz="2000" i="1">
+                                <a:latin typeface="Cambria Math" panose="02040503050406030204" pitchFamily="18" charset="0"/>
+                                <a:ea typeface="Cambria Math" panose="02040503050406030204" pitchFamily="18" charset="0"/>
+                              </a:rPr>
+                            </m:ctrlPr>
+                          </m:sSubPr>
+                          <m:e>
+                            <m:r>
+                              <a:rPr lang="it-IT" sz="2000" b="0" i="1" smtClean="0">
+                                <a:latin typeface="Cambria Math" panose="02040503050406030204" pitchFamily="18" charset="0"/>
+                                <a:ea typeface="Cambria Math" panose="02040503050406030204" pitchFamily="18" charset="0"/>
+                              </a:rPr>
+                              <m:t>−</m:t>
+                            </m:r>
+                            <m:r>
+                              <a:rPr lang="it-IT" sz="2000" i="1">
+                                <a:latin typeface="Cambria Math" panose="02040503050406030204" pitchFamily="18" charset="0"/>
+                                <a:ea typeface="Cambria Math" panose="02040503050406030204" pitchFamily="18" charset="0"/>
+                              </a:rPr>
+                              <m:t>𝛼</m:t>
+                            </m:r>
+                          </m:e>
+                          <m:sub>
+                            <m:r>
+                              <a:rPr lang="it-IT" sz="2000" b="0" i="1" smtClean="0">
+                                <a:latin typeface="Cambria Math" panose="02040503050406030204" pitchFamily="18" charset="0"/>
+                                <a:ea typeface="Cambria Math" panose="02040503050406030204" pitchFamily="18" charset="0"/>
+                              </a:rPr>
+                              <m:t>1</m:t>
+                            </m:r>
+                          </m:sub>
+                        </m:sSub>
+                        <m:r>
+                          <a:rPr lang="it-IT" sz="2000" b="0" i="1" smtClean="0">
+                            <a:latin typeface="Cambria Math" panose="02040503050406030204" pitchFamily="18" charset="0"/>
+                          </a:rPr>
+                          <m:t>𝑆</m:t>
+                        </m:r>
+                        <m:r>
+                          <a:rPr lang="it-IT" sz="2000" b="0" i="1" smtClean="0">
+                            <a:latin typeface="Cambria Math" panose="02040503050406030204" pitchFamily="18" charset="0"/>
+                          </a:rPr>
+                          <m:t>+</m:t>
+                        </m:r>
+                        <m:sSup>
+                          <m:sSupPr>
+                            <m:ctrlPr>
+                              <a:rPr lang="it-IT" sz="2000" b="0" i="1" smtClean="0">
+                                <a:latin typeface="Cambria Math" panose="02040503050406030204" pitchFamily="18" charset="0"/>
+                              </a:rPr>
+                            </m:ctrlPr>
+                          </m:sSupPr>
+                          <m:e>
+                            <m:f>
+                              <m:fPr>
+                                <m:ctrlPr>
+                                  <a:rPr lang="it-IT" sz="2000" b="0" i="1" smtClean="0">
+                                    <a:latin typeface="Cambria Math" panose="02040503050406030204" pitchFamily="18" charset="0"/>
+                                  </a:rPr>
+                                </m:ctrlPr>
+                              </m:fPr>
+                              <m:num>
+                                <m:r>
+                                  <a:rPr lang="it-IT" sz="2000" b="0" i="1" smtClean="0">
+                                    <a:latin typeface="Cambria Math" panose="02040503050406030204" pitchFamily="18" charset="0"/>
+                                  </a:rPr>
+                                  <m:t>1</m:t>
+                                </m:r>
+                              </m:num>
+                              <m:den>
+                                <m:r>
+                                  <a:rPr lang="it-IT" sz="2000" b="0" i="1" smtClean="0">
+                                    <a:latin typeface="Cambria Math" panose="02040503050406030204" pitchFamily="18" charset="0"/>
+                                  </a:rPr>
+                                  <m:t>2</m:t>
+                                </m:r>
+                              </m:den>
+                            </m:f>
+                            <m:r>
+                              <a:rPr lang="it-IT" sz="2000" b="0" i="1" smtClean="0">
+                                <a:latin typeface="Cambria Math" panose="02040503050406030204" pitchFamily="18" charset="0"/>
+                              </a:rPr>
+                              <m:t>𝑢</m:t>
+                            </m:r>
+                          </m:e>
+                          <m:sup>
+                            <m:r>
+                              <a:rPr lang="it-IT" sz="2000" b="0" i="1" smtClean="0">
+                                <a:latin typeface="Cambria Math" panose="02040503050406030204" pitchFamily="18" charset="0"/>
+                              </a:rPr>
+                              <m:t>𝑇</m:t>
+                            </m:r>
+                          </m:sup>
+                        </m:sSup>
+                        <m:r>
+                          <a:rPr lang="it-IT" sz="2000" b="0" i="1" smtClean="0">
+                            <a:latin typeface="Cambria Math" panose="02040503050406030204" pitchFamily="18" charset="0"/>
+                          </a:rPr>
+                          <m:t>𝛽</m:t>
+                        </m:r>
+                        <m:r>
+                          <a:rPr lang="it-IT" sz="2000" b="0" i="1" smtClean="0">
+                            <a:latin typeface="Cambria Math" panose="02040503050406030204" pitchFamily="18" charset="0"/>
+                          </a:rPr>
+                          <m:t>𝑢</m:t>
+                        </m:r>
+                      </m:e>
+                    </m:nary>
+                  </m:oMath>
+                </a14:m>
+                <a:endParaRPr lang="it-IT" sz="2000" dirty="0"/>
+              </a:p>
+              <a:p>
+                <a:pPr marL="342900" indent="-342900">
+                  <a:lnSpc>
+                    <a:spcPct val="200000"/>
+                  </a:lnSpc>
+                  <a:buFont typeface="Arial" panose="020B0604020202020204" pitchFamily="34" charset="0"/>
+                  <a:buChar char="•"/>
+                </a:pPr>
+                <a14:m>
+                  <m:oMath xmlns:m="http://schemas.openxmlformats.org/officeDocument/2006/math">
+                    <m:sSub>
+                      <m:sSubPr>
+                        <m:ctrlPr>
+                          <a:rPr lang="it-IT" sz="2000" b="0" i="1" smtClean="0">
+                            <a:latin typeface="Cambria Math" panose="02040503050406030204" pitchFamily="18" charset="0"/>
+                          </a:rPr>
+                        </m:ctrlPr>
+                      </m:sSubPr>
+                      <m:e>
+                        <m:r>
+                          <a:rPr lang="it-IT" sz="2000" b="0" i="1" smtClean="0">
+                            <a:latin typeface="Cambria Math" panose="02040503050406030204" pitchFamily="18" charset="0"/>
+                          </a:rPr>
+                          <m:t>𝐽</m:t>
+                        </m:r>
+                      </m:e>
+                      <m:sub>
+                        <m:r>
+                          <a:rPr lang="it-IT" sz="2000" b="0" i="1" smtClean="0">
+                            <a:latin typeface="Cambria Math" panose="02040503050406030204" pitchFamily="18" charset="0"/>
+                          </a:rPr>
+                          <m:t>2</m:t>
+                        </m:r>
+                      </m:sub>
+                    </m:sSub>
+                    <m:d>
+                      <m:dPr>
+                        <m:ctrlPr>
+                          <a:rPr lang="it-IT" sz="2000" b="0" i="1" smtClean="0">
+                            <a:latin typeface="Cambria Math" panose="02040503050406030204" pitchFamily="18" charset="0"/>
+                          </a:rPr>
+                        </m:ctrlPr>
+                      </m:dPr>
+                      <m:e>
+                        <m:r>
+                          <a:rPr lang="it-IT" sz="2000" b="0" i="1" smtClean="0">
+                            <a:latin typeface="Cambria Math" panose="02040503050406030204" pitchFamily="18" charset="0"/>
+                          </a:rPr>
+                          <m:t>𝑢</m:t>
+                        </m:r>
+                      </m:e>
+                    </m:d>
+                    <m:r>
+                      <a:rPr lang="it-IT" sz="2000" b="0" i="1" smtClean="0">
+                        <a:latin typeface="Cambria Math" panose="02040503050406030204" pitchFamily="18" charset="0"/>
+                      </a:rPr>
+                      <m:t>=</m:t>
+                    </m:r>
+                    <m:nary>
+                      <m:naryPr>
+                        <m:ctrlPr>
+                          <a:rPr lang="it-IT" sz="2000" i="1" smtClean="0">
+                            <a:latin typeface="Cambria Math" panose="02040503050406030204" pitchFamily="18" charset="0"/>
+                          </a:rPr>
+                        </m:ctrlPr>
+                      </m:naryPr>
+                      <m:sub>
+                        <m:r>
+                          <m:rPr>
+                            <m:brk m:alnAt="23"/>
+                          </m:rPr>
+                          <a:rPr lang="it-IT" sz="2000" b="0" i="1" smtClean="0">
+                            <a:latin typeface="Cambria Math" panose="02040503050406030204" pitchFamily="18" charset="0"/>
+                          </a:rPr>
+                          <m:t>0</m:t>
+                        </m:r>
+                      </m:sub>
+                      <m:sup>
+                        <m:sSub>
+                          <m:sSubPr>
+                            <m:ctrlPr>
+                              <a:rPr lang="it-IT" sz="2000" b="0" i="1" smtClean="0">
+                                <a:latin typeface="Cambria Math" panose="02040503050406030204" pitchFamily="18" charset="0"/>
+                              </a:rPr>
+                            </m:ctrlPr>
+                          </m:sSubPr>
+                          <m:e>
+                            <m:r>
+                              <a:rPr lang="it-IT" sz="2000" b="0" i="1" smtClean="0">
+                                <a:latin typeface="Cambria Math" panose="02040503050406030204" pitchFamily="18" charset="0"/>
+                              </a:rPr>
+                              <m:t>𝑡</m:t>
+                            </m:r>
+                          </m:e>
+                          <m:sub>
+                            <m:r>
+                              <a:rPr lang="it-IT" sz="2000" b="0" i="1" smtClean="0">
+                                <a:latin typeface="Cambria Math" panose="02040503050406030204" pitchFamily="18" charset="0"/>
+                              </a:rPr>
+                              <m:t>𝑓</m:t>
+                            </m:r>
+                          </m:sub>
+                        </m:sSub>
+                      </m:sup>
+                      <m:e>
+                        <m:sSub>
+                          <m:sSubPr>
+                            <m:ctrlPr>
+                              <a:rPr lang="it-IT" sz="2000" i="1">
+                                <a:latin typeface="Cambria Math" panose="02040503050406030204" pitchFamily="18" charset="0"/>
+                                <a:ea typeface="Cambria Math" panose="02040503050406030204" pitchFamily="18" charset="0"/>
+                              </a:rPr>
+                            </m:ctrlPr>
+                          </m:sSubPr>
+                          <m:e>
+                            <m:r>
+                              <a:rPr lang="it-IT" sz="2000" i="1">
+                                <a:latin typeface="Cambria Math" panose="02040503050406030204" pitchFamily="18" charset="0"/>
+                                <a:ea typeface="Cambria Math" panose="02040503050406030204" pitchFamily="18" charset="0"/>
+                              </a:rPr>
+                              <m:t>𝛾</m:t>
+                            </m:r>
+                          </m:e>
+                          <m:sub>
+                            <m:r>
+                              <a:rPr lang="it-IT" sz="2000" b="0" i="1" smtClean="0">
+                                <a:latin typeface="Cambria Math" panose="02040503050406030204" pitchFamily="18" charset="0"/>
+                                <a:ea typeface="Cambria Math" panose="02040503050406030204" pitchFamily="18" charset="0"/>
+                              </a:rPr>
+                              <m:t>1</m:t>
+                            </m:r>
+                          </m:sub>
+                        </m:sSub>
+                        <m:sSub>
+                          <m:sSubPr>
+                            <m:ctrlPr>
+                              <a:rPr lang="it-IT" sz="2000" b="0" i="1" smtClean="0">
+                                <a:latin typeface="Cambria Math" panose="02040503050406030204" pitchFamily="18" charset="0"/>
+                                <a:ea typeface="Cambria Math" panose="02040503050406030204" pitchFamily="18" charset="0"/>
+                              </a:rPr>
+                            </m:ctrlPr>
+                          </m:sSubPr>
+                          <m:e>
+                            <m:r>
+                              <a:rPr lang="it-IT" sz="2000" b="0" i="1" smtClean="0">
+                                <a:latin typeface="Cambria Math" panose="02040503050406030204" pitchFamily="18" charset="0"/>
+                                <a:ea typeface="Cambria Math" panose="02040503050406030204" pitchFamily="18" charset="0"/>
+                              </a:rPr>
+                              <m:t>𝐼</m:t>
+                            </m:r>
+                          </m:e>
+                          <m:sub>
+                            <m:r>
+                              <a:rPr lang="it-IT" sz="2000" b="0" i="1" smtClean="0">
+                                <a:latin typeface="Cambria Math" panose="02040503050406030204" pitchFamily="18" charset="0"/>
+                                <a:ea typeface="Cambria Math" panose="02040503050406030204" pitchFamily="18" charset="0"/>
+                              </a:rPr>
+                              <m:t>1</m:t>
+                            </m:r>
+                          </m:sub>
+                        </m:sSub>
+                        <m:r>
+                          <a:rPr lang="it-IT" sz="2000" b="0" i="1" smtClean="0">
+                            <a:latin typeface="Cambria Math" panose="02040503050406030204" pitchFamily="18" charset="0"/>
+                            <a:ea typeface="Cambria Math" panose="02040503050406030204" pitchFamily="18" charset="0"/>
+                          </a:rPr>
+                          <m:t>+</m:t>
+                        </m:r>
+                        <m:sSub>
+                          <m:sSubPr>
+                            <m:ctrlPr>
+                              <a:rPr lang="it-IT" sz="2000" b="0" i="1" smtClean="0">
+                                <a:latin typeface="Cambria Math" panose="02040503050406030204" pitchFamily="18" charset="0"/>
+                                <a:ea typeface="Cambria Math" panose="02040503050406030204" pitchFamily="18" charset="0"/>
+                              </a:rPr>
+                            </m:ctrlPr>
+                          </m:sSubPr>
+                          <m:e>
+                            <m:r>
+                              <a:rPr lang="it-IT" sz="2000" b="0" i="1" smtClean="0">
+                                <a:latin typeface="Cambria Math" panose="02040503050406030204" pitchFamily="18" charset="0"/>
+                                <a:ea typeface="Cambria Math" panose="02040503050406030204" pitchFamily="18" charset="0"/>
+                              </a:rPr>
+                              <m:t>𝛾</m:t>
+                            </m:r>
+                          </m:e>
+                          <m:sub>
+                            <m:r>
+                              <a:rPr lang="it-IT" sz="2000" b="0" i="1" smtClean="0">
+                                <a:latin typeface="Cambria Math" panose="02040503050406030204" pitchFamily="18" charset="0"/>
+                                <a:ea typeface="Cambria Math" panose="02040503050406030204" pitchFamily="18" charset="0"/>
+                              </a:rPr>
+                              <m:t>2</m:t>
+                            </m:r>
+                          </m:sub>
+                        </m:sSub>
+                        <m:sSub>
+                          <m:sSubPr>
+                            <m:ctrlPr>
+                              <a:rPr lang="it-IT" sz="2000" b="0" i="1" smtClean="0">
+                                <a:latin typeface="Cambria Math" panose="02040503050406030204" pitchFamily="18" charset="0"/>
+                                <a:ea typeface="Cambria Math" panose="02040503050406030204" pitchFamily="18" charset="0"/>
+                              </a:rPr>
+                            </m:ctrlPr>
+                          </m:sSubPr>
+                          <m:e>
+                            <m:r>
+                              <a:rPr lang="it-IT" sz="2000" b="0" i="1" smtClean="0">
+                                <a:latin typeface="Cambria Math" panose="02040503050406030204" pitchFamily="18" charset="0"/>
+                                <a:ea typeface="Cambria Math" panose="02040503050406030204" pitchFamily="18" charset="0"/>
+                              </a:rPr>
+                              <m:t>𝐼</m:t>
+                            </m:r>
+                          </m:e>
+                          <m:sub>
+                            <m:r>
+                              <a:rPr lang="it-IT" sz="2000" b="0" i="1" smtClean="0">
+                                <a:latin typeface="Cambria Math" panose="02040503050406030204" pitchFamily="18" charset="0"/>
+                                <a:ea typeface="Cambria Math" panose="02040503050406030204" pitchFamily="18" charset="0"/>
+                              </a:rPr>
+                              <m:t>2</m:t>
+                            </m:r>
+                          </m:sub>
+                        </m:sSub>
+                        <m:r>
+                          <a:rPr lang="it-IT" sz="2000" b="0" i="1" smtClean="0">
+                            <a:latin typeface="Cambria Math" panose="02040503050406030204" pitchFamily="18" charset="0"/>
+                          </a:rPr>
+                          <m:t>+</m:t>
+                        </m:r>
+                        <m:sSup>
+                          <m:sSupPr>
+                            <m:ctrlPr>
+                              <a:rPr lang="it-IT" sz="2000" b="0" i="1" smtClean="0">
+                                <a:latin typeface="Cambria Math" panose="02040503050406030204" pitchFamily="18" charset="0"/>
+                              </a:rPr>
+                            </m:ctrlPr>
+                          </m:sSupPr>
+                          <m:e>
+                            <m:f>
+                              <m:fPr>
+                                <m:ctrlPr>
+                                  <a:rPr lang="it-IT" sz="2000" b="0" i="1" smtClean="0">
+                                    <a:latin typeface="Cambria Math" panose="02040503050406030204" pitchFamily="18" charset="0"/>
+                                  </a:rPr>
+                                </m:ctrlPr>
+                              </m:fPr>
+                              <m:num>
+                                <m:r>
+                                  <a:rPr lang="it-IT" sz="2000" b="0" i="1" smtClean="0">
+                                    <a:latin typeface="Cambria Math" panose="02040503050406030204" pitchFamily="18" charset="0"/>
+                                  </a:rPr>
+                                  <m:t>1</m:t>
+                                </m:r>
+                              </m:num>
+                              <m:den>
+                                <m:r>
+                                  <a:rPr lang="it-IT" sz="2000" b="0" i="1" smtClean="0">
+                                    <a:latin typeface="Cambria Math" panose="02040503050406030204" pitchFamily="18" charset="0"/>
+                                  </a:rPr>
+                                  <m:t>2</m:t>
+                                </m:r>
+                              </m:den>
+                            </m:f>
+                            <m:r>
+                              <a:rPr lang="it-IT" sz="2000" b="0" i="1" smtClean="0">
+                                <a:latin typeface="Cambria Math" panose="02040503050406030204" pitchFamily="18" charset="0"/>
+                              </a:rPr>
+                              <m:t>𝑢</m:t>
+                            </m:r>
+                          </m:e>
+                          <m:sup>
+                            <m:r>
+                              <a:rPr lang="it-IT" sz="2000" b="0" i="1" smtClean="0">
+                                <a:latin typeface="Cambria Math" panose="02040503050406030204" pitchFamily="18" charset="0"/>
+                              </a:rPr>
+                              <m:t>𝑇</m:t>
+                            </m:r>
+                          </m:sup>
+                        </m:sSup>
+                        <m:r>
+                          <a:rPr lang="it-IT" sz="2000" b="0" i="1" smtClean="0">
+                            <a:latin typeface="Cambria Math" panose="02040503050406030204" pitchFamily="18" charset="0"/>
+                          </a:rPr>
+                          <m:t>𝛽</m:t>
+                        </m:r>
+                        <m:r>
+                          <a:rPr lang="it-IT" sz="2000" b="0" i="1" smtClean="0">
+                            <a:latin typeface="Cambria Math" panose="02040503050406030204" pitchFamily="18" charset="0"/>
+                          </a:rPr>
+                          <m:t>𝑢</m:t>
+                        </m:r>
+                      </m:e>
+                    </m:nary>
+                  </m:oMath>
+                </a14:m>
+                <a:endParaRPr lang="it-IT" sz="2000" b="0" dirty="0"/>
+              </a:p>
+              <a:p>
+                <a:pPr marL="342900" indent="-342900">
+                  <a:lnSpc>
+                    <a:spcPct val="200000"/>
+                  </a:lnSpc>
+                  <a:buFont typeface="Arial" panose="020B0604020202020204" pitchFamily="34" charset="0"/>
+                  <a:buChar char="•"/>
+                </a:pPr>
+                <a14:m>
+                  <m:oMath xmlns:m="http://schemas.openxmlformats.org/officeDocument/2006/math">
+                    <m:sSub>
+                      <m:sSubPr>
+                        <m:ctrlPr>
+                          <a:rPr lang="it-IT" sz="2000" b="0" i="1" smtClean="0">
+                            <a:latin typeface="Cambria Math" panose="02040503050406030204" pitchFamily="18" charset="0"/>
+                          </a:rPr>
+                        </m:ctrlPr>
+                      </m:sSubPr>
+                      <m:e>
+                        <m:r>
+                          <a:rPr lang="it-IT" sz="2000" b="0" i="1" smtClean="0">
+                            <a:latin typeface="Cambria Math" panose="02040503050406030204" pitchFamily="18" charset="0"/>
+                          </a:rPr>
+                          <m:t>𝐽</m:t>
+                        </m:r>
+                      </m:e>
+                      <m:sub>
+                        <m:r>
+                          <a:rPr lang="it-IT" sz="2000" b="0" i="1" smtClean="0">
+                            <a:latin typeface="Cambria Math" panose="02040503050406030204" pitchFamily="18" charset="0"/>
+                          </a:rPr>
+                          <m:t>3</m:t>
+                        </m:r>
+                      </m:sub>
+                    </m:sSub>
+                    <m:d>
+                      <m:dPr>
+                        <m:ctrlPr>
+                          <a:rPr lang="it-IT" sz="2000" b="0" i="1" smtClean="0">
+                            <a:latin typeface="Cambria Math" panose="02040503050406030204" pitchFamily="18" charset="0"/>
+                          </a:rPr>
+                        </m:ctrlPr>
+                      </m:dPr>
+                      <m:e>
+                        <m:r>
+                          <a:rPr lang="it-IT" sz="2000" b="0" i="1" smtClean="0">
+                            <a:latin typeface="Cambria Math" panose="02040503050406030204" pitchFamily="18" charset="0"/>
+                          </a:rPr>
+                          <m:t>𝑢</m:t>
+                        </m:r>
+                      </m:e>
+                    </m:d>
+                    <m:r>
+                      <a:rPr lang="it-IT" sz="2000" b="0" i="1" smtClean="0">
+                        <a:latin typeface="Cambria Math" panose="02040503050406030204" pitchFamily="18" charset="0"/>
+                      </a:rPr>
+                      <m:t>=</m:t>
+                    </m:r>
+                    <m:nary>
+                      <m:naryPr>
+                        <m:ctrlPr>
+                          <a:rPr lang="it-IT" sz="2000" i="1" smtClean="0">
+                            <a:latin typeface="Cambria Math" panose="02040503050406030204" pitchFamily="18" charset="0"/>
+                          </a:rPr>
+                        </m:ctrlPr>
+                      </m:naryPr>
+                      <m:sub>
+                        <m:r>
+                          <m:rPr>
+                            <m:brk m:alnAt="23"/>
+                          </m:rPr>
+                          <a:rPr lang="it-IT" sz="2000" b="0" i="1" smtClean="0">
+                            <a:latin typeface="Cambria Math" panose="02040503050406030204" pitchFamily="18" charset="0"/>
+                          </a:rPr>
+                          <m:t>0</m:t>
+                        </m:r>
+                      </m:sub>
+                      <m:sup>
+                        <m:sSub>
+                          <m:sSubPr>
+                            <m:ctrlPr>
+                              <a:rPr lang="it-IT" sz="2000" b="0" i="1" smtClean="0">
+                                <a:latin typeface="Cambria Math" panose="02040503050406030204" pitchFamily="18" charset="0"/>
+                              </a:rPr>
+                            </m:ctrlPr>
+                          </m:sSubPr>
+                          <m:e>
+                            <m:r>
+                              <a:rPr lang="it-IT" sz="2000" b="0" i="1" smtClean="0">
+                                <a:latin typeface="Cambria Math" panose="02040503050406030204" pitchFamily="18" charset="0"/>
+                              </a:rPr>
+                              <m:t>𝑡</m:t>
+                            </m:r>
+                          </m:e>
+                          <m:sub>
+                            <m:r>
+                              <a:rPr lang="it-IT" sz="2000" b="0" i="1" smtClean="0">
+                                <a:latin typeface="Cambria Math" panose="02040503050406030204" pitchFamily="18" charset="0"/>
+                              </a:rPr>
+                              <m:t>𝑓</m:t>
+                            </m:r>
+                          </m:sub>
+                        </m:sSub>
+                      </m:sup>
+                      <m:e>
+                        <m:sSub>
+                          <m:sSubPr>
+                            <m:ctrlPr>
+                              <a:rPr lang="it-IT" sz="2000" i="1">
+                                <a:latin typeface="Cambria Math" panose="02040503050406030204" pitchFamily="18" charset="0"/>
+                                <a:ea typeface="Cambria Math" panose="02040503050406030204" pitchFamily="18" charset="0"/>
+                              </a:rPr>
+                            </m:ctrlPr>
+                          </m:sSubPr>
+                          <m:e>
+                            <m:r>
+                              <a:rPr lang="it-IT" sz="2000" i="1">
+                                <a:latin typeface="Cambria Math" panose="02040503050406030204" pitchFamily="18" charset="0"/>
+                                <a:ea typeface="Cambria Math" panose="02040503050406030204" pitchFamily="18" charset="0"/>
+                              </a:rPr>
+                              <m:t>−</m:t>
+                            </m:r>
+                            <m:r>
+                              <a:rPr lang="it-IT" sz="2000" i="1" smtClean="0">
+                                <a:latin typeface="Cambria Math" panose="02040503050406030204" pitchFamily="18" charset="0"/>
+                                <a:ea typeface="Cambria Math" panose="02040503050406030204" pitchFamily="18" charset="0"/>
+                              </a:rPr>
+                              <m:t>𝛼</m:t>
+                            </m:r>
+                          </m:e>
+                          <m:sub>
+                            <m:r>
+                              <a:rPr lang="it-IT" sz="2000" b="0" i="1" smtClean="0">
+                                <a:latin typeface="Cambria Math" panose="02040503050406030204" pitchFamily="18" charset="0"/>
+                                <a:ea typeface="Cambria Math" panose="02040503050406030204" pitchFamily="18" charset="0"/>
+                              </a:rPr>
+                              <m:t>2</m:t>
+                            </m:r>
+                          </m:sub>
+                        </m:sSub>
+                        <m:r>
+                          <a:rPr lang="it-IT" sz="2000" i="1">
+                            <a:latin typeface="Cambria Math" panose="02040503050406030204" pitchFamily="18" charset="0"/>
+                          </a:rPr>
+                          <m:t>𝑆</m:t>
+                        </m:r>
+                        <m:r>
+                          <a:rPr lang="it-IT" sz="2000" b="0" i="1" smtClean="0">
+                            <a:latin typeface="Cambria Math" panose="02040503050406030204" pitchFamily="18" charset="0"/>
+                          </a:rPr>
+                          <m:t>+</m:t>
+                        </m:r>
+                        <m:sSub>
+                          <m:sSubPr>
+                            <m:ctrlPr>
+                              <a:rPr lang="it-IT" sz="2000" i="1">
+                                <a:latin typeface="Cambria Math" panose="02040503050406030204" pitchFamily="18" charset="0"/>
+                                <a:ea typeface="Cambria Math" panose="02040503050406030204" pitchFamily="18" charset="0"/>
+                              </a:rPr>
+                            </m:ctrlPr>
+                          </m:sSubPr>
+                          <m:e>
+                            <m:r>
+                              <a:rPr lang="it-IT" sz="2000" i="1">
+                                <a:latin typeface="Cambria Math" panose="02040503050406030204" pitchFamily="18" charset="0"/>
+                                <a:ea typeface="Cambria Math" panose="02040503050406030204" pitchFamily="18" charset="0"/>
+                              </a:rPr>
+                              <m:t>𝛾</m:t>
+                            </m:r>
+                          </m:e>
+                          <m:sub>
+                            <m:r>
+                              <a:rPr lang="it-IT" sz="2000" b="0" i="1" smtClean="0">
+                                <a:latin typeface="Cambria Math" panose="02040503050406030204" pitchFamily="18" charset="0"/>
+                                <a:ea typeface="Cambria Math" panose="02040503050406030204" pitchFamily="18" charset="0"/>
+                              </a:rPr>
+                              <m:t>3</m:t>
+                            </m:r>
+                          </m:sub>
+                        </m:sSub>
+                        <m:sSub>
+                          <m:sSubPr>
+                            <m:ctrlPr>
+                              <a:rPr lang="it-IT" sz="2000" b="0" i="1" smtClean="0">
+                                <a:latin typeface="Cambria Math" panose="02040503050406030204" pitchFamily="18" charset="0"/>
+                                <a:ea typeface="Cambria Math" panose="02040503050406030204" pitchFamily="18" charset="0"/>
+                              </a:rPr>
+                            </m:ctrlPr>
+                          </m:sSubPr>
+                          <m:e>
+                            <m:r>
+                              <a:rPr lang="it-IT" sz="2000" b="0" i="1" smtClean="0">
+                                <a:latin typeface="Cambria Math" panose="02040503050406030204" pitchFamily="18" charset="0"/>
+                                <a:ea typeface="Cambria Math" panose="02040503050406030204" pitchFamily="18" charset="0"/>
+                              </a:rPr>
+                              <m:t>𝐼</m:t>
+                            </m:r>
+                          </m:e>
+                          <m:sub>
+                            <m:r>
+                              <a:rPr lang="it-IT" sz="2000" b="0" i="1" smtClean="0">
+                                <a:latin typeface="Cambria Math" panose="02040503050406030204" pitchFamily="18" charset="0"/>
+                                <a:ea typeface="Cambria Math" panose="02040503050406030204" pitchFamily="18" charset="0"/>
+                              </a:rPr>
+                              <m:t>1</m:t>
+                            </m:r>
+                          </m:sub>
+                        </m:sSub>
+                        <m:r>
+                          <a:rPr lang="it-IT" sz="2000" b="0" i="1" smtClean="0">
+                            <a:latin typeface="Cambria Math" panose="02040503050406030204" pitchFamily="18" charset="0"/>
+                            <a:ea typeface="Cambria Math" panose="02040503050406030204" pitchFamily="18" charset="0"/>
+                          </a:rPr>
+                          <m:t>+</m:t>
+                        </m:r>
+                        <m:sSub>
+                          <m:sSubPr>
+                            <m:ctrlPr>
+                              <a:rPr lang="it-IT" sz="2000" b="0" i="1" smtClean="0">
+                                <a:latin typeface="Cambria Math" panose="02040503050406030204" pitchFamily="18" charset="0"/>
+                                <a:ea typeface="Cambria Math" panose="02040503050406030204" pitchFamily="18" charset="0"/>
+                              </a:rPr>
+                            </m:ctrlPr>
+                          </m:sSubPr>
+                          <m:e>
+                            <m:r>
+                              <a:rPr lang="it-IT" sz="2000" b="0" i="1" smtClean="0">
+                                <a:latin typeface="Cambria Math" panose="02040503050406030204" pitchFamily="18" charset="0"/>
+                                <a:ea typeface="Cambria Math" panose="02040503050406030204" pitchFamily="18" charset="0"/>
+                              </a:rPr>
+                              <m:t>𝛾</m:t>
+                            </m:r>
+                          </m:e>
+                          <m:sub>
+                            <m:r>
+                              <a:rPr lang="it-IT" sz="2000" b="0" i="1" smtClean="0">
+                                <a:latin typeface="Cambria Math" panose="02040503050406030204" pitchFamily="18" charset="0"/>
+                                <a:ea typeface="Cambria Math" panose="02040503050406030204" pitchFamily="18" charset="0"/>
+                              </a:rPr>
+                              <m:t>4</m:t>
+                            </m:r>
+                          </m:sub>
+                        </m:sSub>
+                        <m:sSub>
+                          <m:sSubPr>
+                            <m:ctrlPr>
+                              <a:rPr lang="it-IT" sz="2000" b="0" i="1" smtClean="0">
+                                <a:latin typeface="Cambria Math" panose="02040503050406030204" pitchFamily="18" charset="0"/>
+                                <a:ea typeface="Cambria Math" panose="02040503050406030204" pitchFamily="18" charset="0"/>
+                              </a:rPr>
+                            </m:ctrlPr>
+                          </m:sSubPr>
+                          <m:e>
+                            <m:r>
+                              <a:rPr lang="it-IT" sz="2000" b="0" i="1" smtClean="0">
+                                <a:latin typeface="Cambria Math" panose="02040503050406030204" pitchFamily="18" charset="0"/>
+                                <a:ea typeface="Cambria Math" panose="02040503050406030204" pitchFamily="18" charset="0"/>
+                              </a:rPr>
+                              <m:t>𝐼</m:t>
+                            </m:r>
+                          </m:e>
+                          <m:sub>
+                            <m:r>
+                              <a:rPr lang="it-IT" sz="2000" b="0" i="1" smtClean="0">
+                                <a:latin typeface="Cambria Math" panose="02040503050406030204" pitchFamily="18" charset="0"/>
+                                <a:ea typeface="Cambria Math" panose="02040503050406030204" pitchFamily="18" charset="0"/>
+                              </a:rPr>
+                              <m:t>2</m:t>
+                            </m:r>
+                          </m:sub>
+                        </m:sSub>
+                        <m:r>
+                          <a:rPr lang="it-IT" sz="2000" b="0" i="1" smtClean="0">
+                            <a:latin typeface="Cambria Math" panose="02040503050406030204" pitchFamily="18" charset="0"/>
+                          </a:rPr>
+                          <m:t>+</m:t>
+                        </m:r>
+                        <m:sSup>
+                          <m:sSupPr>
+                            <m:ctrlPr>
+                              <a:rPr lang="it-IT" sz="2000" b="0" i="1" smtClean="0">
+                                <a:latin typeface="Cambria Math" panose="02040503050406030204" pitchFamily="18" charset="0"/>
+                              </a:rPr>
+                            </m:ctrlPr>
+                          </m:sSupPr>
+                          <m:e>
+                            <m:f>
+                              <m:fPr>
+                                <m:ctrlPr>
+                                  <a:rPr lang="it-IT" sz="2000" b="0" i="1" smtClean="0">
+                                    <a:latin typeface="Cambria Math" panose="02040503050406030204" pitchFamily="18" charset="0"/>
+                                  </a:rPr>
+                                </m:ctrlPr>
+                              </m:fPr>
+                              <m:num>
+                                <m:r>
+                                  <a:rPr lang="it-IT" sz="2000" b="0" i="1" smtClean="0">
+                                    <a:latin typeface="Cambria Math" panose="02040503050406030204" pitchFamily="18" charset="0"/>
+                                  </a:rPr>
+                                  <m:t>1</m:t>
+                                </m:r>
+                              </m:num>
+                              <m:den>
+                                <m:r>
+                                  <a:rPr lang="it-IT" sz="2000" b="0" i="1" smtClean="0">
+                                    <a:latin typeface="Cambria Math" panose="02040503050406030204" pitchFamily="18" charset="0"/>
+                                  </a:rPr>
+                                  <m:t>2</m:t>
+                                </m:r>
+                              </m:den>
+                            </m:f>
+                            <m:r>
+                              <a:rPr lang="it-IT" sz="2000" b="0" i="1" smtClean="0">
+                                <a:latin typeface="Cambria Math" panose="02040503050406030204" pitchFamily="18" charset="0"/>
+                              </a:rPr>
+                              <m:t>𝑢</m:t>
+                            </m:r>
+                          </m:e>
+                          <m:sup>
+                            <m:r>
+                              <a:rPr lang="it-IT" sz="2000" b="0" i="1" smtClean="0">
+                                <a:latin typeface="Cambria Math" panose="02040503050406030204" pitchFamily="18" charset="0"/>
+                              </a:rPr>
+                              <m:t>𝑇</m:t>
+                            </m:r>
+                          </m:sup>
+                        </m:sSup>
+                        <m:r>
+                          <a:rPr lang="it-IT" sz="2000" b="0" i="1" smtClean="0">
+                            <a:latin typeface="Cambria Math" panose="02040503050406030204" pitchFamily="18" charset="0"/>
+                          </a:rPr>
+                          <m:t>𝛽</m:t>
+                        </m:r>
+                        <m:r>
+                          <a:rPr lang="it-IT" sz="2000" b="0" i="1" smtClean="0">
+                            <a:latin typeface="Cambria Math" panose="02040503050406030204" pitchFamily="18" charset="0"/>
+                          </a:rPr>
+                          <m:t>𝑢</m:t>
+                        </m:r>
+                      </m:e>
+                    </m:nary>
+                  </m:oMath>
+                </a14:m>
+                <a:endParaRPr lang="it-IT" sz="2000" b="0" dirty="0"/>
+              </a:p>
+              <a:p>
+                <a:pPr marL="342900" indent="-342900">
+                  <a:lnSpc>
+                    <a:spcPct val="200000"/>
+                  </a:lnSpc>
+                  <a:buFont typeface="Arial" panose="020B0604020202020204" pitchFamily="34" charset="0"/>
+                  <a:buChar char="•"/>
+                </a:pPr>
+                <a14:m>
+                  <m:oMath xmlns:m="http://schemas.openxmlformats.org/officeDocument/2006/math">
+                    <m:sSub>
+                      <m:sSubPr>
+                        <m:ctrlPr>
+                          <a:rPr lang="it-IT" sz="2000" b="0" i="1" smtClean="0">
+                            <a:latin typeface="Cambria Math" panose="02040503050406030204" pitchFamily="18" charset="0"/>
+                          </a:rPr>
+                        </m:ctrlPr>
+                      </m:sSubPr>
+                      <m:e>
+                        <m:r>
+                          <a:rPr lang="it-IT" sz="2000" b="0" i="1" smtClean="0">
+                            <a:latin typeface="Cambria Math" panose="02040503050406030204" pitchFamily="18" charset="0"/>
+                          </a:rPr>
+                          <m:t>𝐽</m:t>
+                        </m:r>
+                      </m:e>
+                      <m:sub>
+                        <m:r>
+                          <a:rPr lang="it-IT" sz="2000" b="0" i="1" smtClean="0">
+                            <a:latin typeface="Cambria Math" panose="02040503050406030204" pitchFamily="18" charset="0"/>
+                          </a:rPr>
+                          <m:t>4</m:t>
+                        </m:r>
+                      </m:sub>
+                    </m:sSub>
+                    <m:d>
+                      <m:dPr>
+                        <m:ctrlPr>
+                          <a:rPr lang="it-IT" sz="2000" b="0" i="1" smtClean="0">
+                            <a:latin typeface="Cambria Math" panose="02040503050406030204" pitchFamily="18" charset="0"/>
+                          </a:rPr>
+                        </m:ctrlPr>
+                      </m:dPr>
+                      <m:e>
+                        <m:r>
+                          <a:rPr lang="it-IT" sz="2000" b="0" i="1" smtClean="0">
+                            <a:latin typeface="Cambria Math" panose="02040503050406030204" pitchFamily="18" charset="0"/>
+                          </a:rPr>
+                          <m:t>𝑢</m:t>
+                        </m:r>
+                      </m:e>
+                    </m:d>
+                    <m:r>
+                      <a:rPr lang="it-IT" sz="2000" b="0" i="1" smtClean="0">
+                        <a:latin typeface="Cambria Math" panose="02040503050406030204" pitchFamily="18" charset="0"/>
+                      </a:rPr>
+                      <m:t>=</m:t>
+                    </m:r>
+                    <m:nary>
+                      <m:naryPr>
+                        <m:ctrlPr>
+                          <a:rPr lang="it-IT" sz="2000" i="1" smtClean="0">
+                            <a:latin typeface="Cambria Math" panose="02040503050406030204" pitchFamily="18" charset="0"/>
+                          </a:rPr>
+                        </m:ctrlPr>
+                      </m:naryPr>
+                      <m:sub>
+                        <m:r>
+                          <m:rPr>
+                            <m:brk m:alnAt="23"/>
+                          </m:rPr>
+                          <a:rPr lang="it-IT" sz="2000" b="0" i="1" smtClean="0">
+                            <a:latin typeface="Cambria Math" panose="02040503050406030204" pitchFamily="18" charset="0"/>
+                          </a:rPr>
+                          <m:t>0</m:t>
+                        </m:r>
+                      </m:sub>
+                      <m:sup>
+                        <m:sSub>
+                          <m:sSubPr>
+                            <m:ctrlPr>
+                              <a:rPr lang="it-IT" sz="2000" b="0" i="1" smtClean="0">
+                                <a:latin typeface="Cambria Math" panose="02040503050406030204" pitchFamily="18" charset="0"/>
+                              </a:rPr>
+                            </m:ctrlPr>
+                          </m:sSubPr>
+                          <m:e>
+                            <m:r>
+                              <a:rPr lang="it-IT" sz="2000" b="0" i="1" smtClean="0">
+                                <a:latin typeface="Cambria Math" panose="02040503050406030204" pitchFamily="18" charset="0"/>
+                              </a:rPr>
+                              <m:t>𝑡</m:t>
+                            </m:r>
+                          </m:e>
+                          <m:sub>
+                            <m:r>
+                              <a:rPr lang="it-IT" sz="2000" b="0" i="1" smtClean="0">
+                                <a:latin typeface="Cambria Math" panose="02040503050406030204" pitchFamily="18" charset="0"/>
+                              </a:rPr>
+                              <m:t>𝑓</m:t>
+                            </m:r>
+                          </m:sub>
+                        </m:sSub>
+                      </m:sup>
+                      <m:e>
+                        <m:r>
+                          <a:rPr lang="it-IT" sz="2000" b="0" i="1" smtClean="0">
+                            <a:latin typeface="Cambria Math" panose="02040503050406030204" pitchFamily="18" charset="0"/>
+                          </a:rPr>
+                          <m:t>𝜁</m:t>
+                        </m:r>
+                        <m:r>
+                          <a:rPr lang="it-IT" sz="2000" b="0" i="1" smtClean="0">
+                            <a:latin typeface="Cambria Math" panose="02040503050406030204" pitchFamily="18" charset="0"/>
+                            <a:ea typeface="Cambria Math" panose="02040503050406030204" pitchFamily="18" charset="0"/>
+                          </a:rPr>
+                          <m:t>𝑉</m:t>
+                        </m:r>
+                        <m:r>
+                          <a:rPr lang="it-IT" sz="2000" b="0" i="1" smtClean="0">
+                            <a:latin typeface="Cambria Math" panose="02040503050406030204" pitchFamily="18" charset="0"/>
+                          </a:rPr>
+                          <m:t>+</m:t>
+                        </m:r>
+                        <m:f>
+                          <m:fPr>
+                            <m:ctrlPr>
+                              <a:rPr lang="it-IT" sz="2000" b="0" i="1" smtClean="0">
+                                <a:latin typeface="Cambria Math" panose="02040503050406030204" pitchFamily="18" charset="0"/>
+                              </a:rPr>
+                            </m:ctrlPr>
+                          </m:fPr>
+                          <m:num>
+                            <m:r>
+                              <a:rPr lang="it-IT" sz="2000" b="0" i="1" smtClean="0">
+                                <a:latin typeface="Cambria Math" panose="02040503050406030204" pitchFamily="18" charset="0"/>
+                              </a:rPr>
+                              <m:t>1</m:t>
+                            </m:r>
+                          </m:num>
+                          <m:den>
+                            <m:r>
+                              <a:rPr lang="it-IT" sz="2000" b="0" i="1" smtClean="0">
+                                <a:latin typeface="Cambria Math" panose="02040503050406030204" pitchFamily="18" charset="0"/>
+                              </a:rPr>
+                              <m:t>2</m:t>
+                            </m:r>
+                          </m:den>
+                        </m:f>
+                        <m:sSup>
+                          <m:sSupPr>
+                            <m:ctrlPr>
+                              <a:rPr lang="it-IT" sz="2000" b="0" i="1" smtClean="0">
+                                <a:latin typeface="Cambria Math" panose="02040503050406030204" pitchFamily="18" charset="0"/>
+                              </a:rPr>
+                            </m:ctrlPr>
+                          </m:sSupPr>
+                          <m:e>
+                            <m:r>
+                              <a:rPr lang="it-IT" sz="2000" b="0" i="1" smtClean="0">
+                                <a:latin typeface="Cambria Math" panose="02040503050406030204" pitchFamily="18" charset="0"/>
+                              </a:rPr>
+                              <m:t>𝑢</m:t>
+                            </m:r>
+                          </m:e>
+                          <m:sup>
+                            <m:r>
+                              <a:rPr lang="it-IT" sz="2000" b="0" i="1" smtClean="0">
+                                <a:latin typeface="Cambria Math" panose="02040503050406030204" pitchFamily="18" charset="0"/>
+                              </a:rPr>
+                              <m:t>𝑇</m:t>
+                            </m:r>
+                          </m:sup>
+                        </m:sSup>
+                        <m:r>
+                          <a:rPr lang="it-IT" sz="2000" b="0" i="1" smtClean="0">
+                            <a:latin typeface="Cambria Math" panose="02040503050406030204" pitchFamily="18" charset="0"/>
+                          </a:rPr>
+                          <m:t>𝛽</m:t>
+                        </m:r>
+                        <m:r>
+                          <a:rPr lang="it-IT" sz="2000" b="0" i="1" smtClean="0">
+                            <a:latin typeface="Cambria Math" panose="02040503050406030204" pitchFamily="18" charset="0"/>
+                          </a:rPr>
+                          <m:t>𝑢</m:t>
+                        </m:r>
+                      </m:e>
+                    </m:nary>
+                  </m:oMath>
+                </a14:m>
+                <a:endParaRPr lang="it-IT" sz="2000" b="0" dirty="0"/>
+              </a:p>
+              <a:p>
+                <a:pPr>
+                  <a:lnSpc>
+                    <a:spcPct val="200000"/>
+                  </a:lnSpc>
+                </a:pPr>
+                <a14:m>
+                  <m:oMathPara xmlns:m="http://schemas.openxmlformats.org/officeDocument/2006/math">
+                    <m:oMathParaPr>
+                      <m:jc m:val="centerGroup"/>
+                    </m:oMathParaPr>
+                    <m:oMath xmlns:m="http://schemas.openxmlformats.org/officeDocument/2006/math">
+                      <m:sSub>
+                        <m:sSubPr>
+                          <m:ctrlPr>
+                            <a:rPr lang="it-IT" sz="2000" b="0" i="1" smtClean="0">
+                              <a:latin typeface="Cambria Math" panose="02040503050406030204" pitchFamily="18" charset="0"/>
+                            </a:rPr>
+                          </m:ctrlPr>
+                        </m:sSubPr>
+                        <m:e>
+                          <m:r>
+                            <a:rPr lang="it-IT" sz="2000" b="0" i="1" smtClean="0">
+                              <a:latin typeface="Cambria Math" panose="02040503050406030204" pitchFamily="18" charset="0"/>
+                            </a:rPr>
+                            <m:t>𝛼</m:t>
+                          </m:r>
+                        </m:e>
+                        <m:sub>
+                          <m:r>
+                            <a:rPr lang="it-IT" sz="2000" b="0" i="1" smtClean="0">
+                              <a:latin typeface="Cambria Math" panose="02040503050406030204" pitchFamily="18" charset="0"/>
+                            </a:rPr>
+                            <m:t>𝑖</m:t>
+                          </m:r>
+                        </m:sub>
+                      </m:sSub>
+                      <m:r>
+                        <a:rPr lang="it-IT" sz="2000" b="0" i="1" smtClean="0">
+                          <a:latin typeface="Cambria Math" panose="02040503050406030204" pitchFamily="18" charset="0"/>
+                        </a:rPr>
+                        <m:t>,</m:t>
+                      </m:r>
+                      <m:r>
+                        <a:rPr lang="it-IT" sz="2000" b="0" i="1" smtClean="0">
+                          <a:latin typeface="Cambria Math" panose="02040503050406030204" pitchFamily="18" charset="0"/>
+                        </a:rPr>
+                        <m:t>𝛽</m:t>
+                      </m:r>
+                      <m:r>
+                        <a:rPr lang="it-IT" sz="2000" b="0" i="1" smtClean="0">
+                          <a:latin typeface="Cambria Math" panose="02040503050406030204" pitchFamily="18" charset="0"/>
+                        </a:rPr>
+                        <m:t>,</m:t>
+                      </m:r>
+                      <m:sSub>
+                        <m:sSubPr>
+                          <m:ctrlPr>
+                            <a:rPr lang="it-IT" sz="2000" b="0" i="1" smtClean="0">
+                              <a:latin typeface="Cambria Math" panose="02040503050406030204" pitchFamily="18" charset="0"/>
+                            </a:rPr>
+                          </m:ctrlPr>
+                        </m:sSubPr>
+                        <m:e>
+                          <m:r>
+                            <a:rPr lang="it-IT" sz="2000" b="0" i="1" smtClean="0">
+                              <a:latin typeface="Cambria Math" panose="02040503050406030204" pitchFamily="18" charset="0"/>
+                            </a:rPr>
+                            <m:t>𝛾</m:t>
+                          </m:r>
+                        </m:e>
+                        <m:sub>
+                          <m:r>
+                            <a:rPr lang="it-IT" sz="2000" b="0" i="1" smtClean="0">
+                              <a:latin typeface="Cambria Math" panose="02040503050406030204" pitchFamily="18" charset="0"/>
+                            </a:rPr>
+                            <m:t>𝑗</m:t>
+                          </m:r>
+                        </m:sub>
+                      </m:sSub>
+                      <m:r>
+                        <a:rPr lang="it-IT" sz="2000" b="0" i="1" smtClean="0">
+                          <a:latin typeface="Cambria Math" panose="02040503050406030204" pitchFamily="18" charset="0"/>
+                        </a:rPr>
+                        <m:t>,</m:t>
+                      </m:r>
+                      <m:r>
+                        <a:rPr lang="it-IT" sz="2000" b="0" i="1" smtClean="0">
+                          <a:latin typeface="Cambria Math" panose="02040503050406030204" pitchFamily="18" charset="0"/>
+                        </a:rPr>
+                        <m:t>𝜁</m:t>
+                      </m:r>
+                      <m:r>
+                        <a:rPr lang="it-IT" sz="2000" b="0" i="1" smtClean="0">
+                          <a:latin typeface="Cambria Math" panose="02040503050406030204" pitchFamily="18" charset="0"/>
+                        </a:rPr>
+                        <m:t>&gt;0 </m:t>
+                      </m:r>
+                      <m:r>
+                        <a:rPr lang="it-IT" sz="2000" b="0" i="1" smtClean="0">
+                          <a:latin typeface="Cambria Math" panose="02040503050406030204" pitchFamily="18" charset="0"/>
+                        </a:rPr>
+                        <m:t>𝑖</m:t>
+                      </m:r>
+                      <m:r>
+                        <a:rPr lang="it-IT" sz="2000" b="0" i="1" smtClean="0">
+                          <a:latin typeface="Cambria Math" panose="02040503050406030204" pitchFamily="18" charset="0"/>
+                        </a:rPr>
+                        <m:t>=1,2;</m:t>
+                      </m:r>
+                      <m:r>
+                        <a:rPr lang="it-IT" sz="2000" b="0" i="1" smtClean="0">
+                          <a:latin typeface="Cambria Math" panose="02040503050406030204" pitchFamily="18" charset="0"/>
+                        </a:rPr>
+                        <m:t>𝑗</m:t>
+                      </m:r>
+                      <m:r>
+                        <a:rPr lang="it-IT" sz="2000" b="0" i="1" smtClean="0">
+                          <a:latin typeface="Cambria Math" panose="02040503050406030204" pitchFamily="18" charset="0"/>
+                        </a:rPr>
+                        <m:t>=1,2,3,4</m:t>
+                      </m:r>
+                    </m:oMath>
+                  </m:oMathPara>
+                </a14:m>
+                <a:endParaRPr lang="it-IT" sz="2000" b="0" i="1" dirty="0">
+                  <a:latin typeface="Cambria Math" panose="02040503050406030204" pitchFamily="18" charset="0"/>
+                </a:endParaRPr>
+              </a:p>
+              <a:p>
+                <a:pPr>
+                  <a:lnSpc>
+                    <a:spcPct val="200000"/>
+                  </a:lnSpc>
+                </a:pPr>
+                <a14:m>
+                  <m:oMathPara xmlns:m="http://schemas.openxmlformats.org/officeDocument/2006/math">
+                    <m:oMathParaPr>
+                      <m:jc m:val="centerGroup"/>
+                    </m:oMathParaPr>
+                    <m:oMath xmlns:m="http://schemas.openxmlformats.org/officeDocument/2006/math">
+                      <m:r>
+                        <a:rPr lang="it-IT" sz="2000" b="0" i="1" smtClean="0">
+                          <a:latin typeface="Cambria Math" panose="02040503050406030204" pitchFamily="18" charset="0"/>
+                        </a:rPr>
+                        <m:t> </m:t>
+                      </m:r>
+                    </m:oMath>
+                  </m:oMathPara>
+                </a14:m>
+                <a:endParaRPr lang="it-IT" sz="2000" b="0" dirty="0"/>
+              </a:p>
+              <a:p>
+                <a:endParaRPr lang="it-IT" b="0" dirty="0"/>
+              </a:p>
+              <a:p>
+                <a:endParaRPr lang="it-IT" dirty="0"/>
+              </a:p>
+            </p:txBody>
+          </p:sp>
+        </mc:Choice>
+        <mc:Fallback>
+          <p:sp>
+            <p:nvSpPr>
+              <p:cNvPr id="4" name="CasellaDiTesto 3">
+                <a:extLst>
+                  <a:ext uri="{FF2B5EF4-FFF2-40B4-BE49-F238E27FC236}">
+                    <a16:creationId xmlns:a16="http://schemas.microsoft.com/office/drawing/2014/main" id="{B1C80E1B-9F62-451F-90C7-D85C0CEF2FD9}"/>
+                  </a:ext>
+                </a:extLst>
+              </p:cNvPr>
+              <p:cNvSpPr txBox="1">
+                <a:spLocks noRot="1" noChangeAspect="1" noMove="1" noResize="1" noEditPoints="1" noAdjustHandles="1" noChangeArrowheads="1" noChangeShapeType="1" noTextEdit="1"/>
+              </p:cNvSpPr>
+              <p:nvPr/>
+            </p:nvSpPr>
+            <p:spPr>
+              <a:xfrm>
+                <a:off x="838200" y="1583879"/>
+                <a:ext cx="4783617" cy="5271187"/>
+              </a:xfrm>
+              <a:prstGeom prst="rect">
+                <a:avLst/>
+              </a:prstGeom>
+              <a:blipFill>
+                <a:blip r:embed="rId2"/>
+                <a:stretch>
+                  <a:fillRect l="-3061" t="-5665" r="-1403"/>
+                </a:stretch>
+              </a:blipFill>
+            </p:spPr>
+            <p:txBody>
+              <a:bodyPr/>
+              <a:lstStyle/>
+              <a:p>
+                <a:r>
+                  <a:rPr lang="it-IT">
+                    <a:noFill/>
+                  </a:rPr>
+                  <a:t> </a:t>
+                </a:r>
+              </a:p>
+            </p:txBody>
+          </p:sp>
+        </mc:Fallback>
+      </mc:AlternateContent>
     </p:spTree>
     <p:extLst>
       <p:ext uri="{BB962C8B-B14F-4D97-AF65-F5344CB8AC3E}">
@@ -14354,10 +15617,604 @@
           <a:bodyPr/>
           <a:lstStyle/>
           <a:p>
-            <a:endParaRPr lang="it-IT"/>
+            <a:pPr marL="0" indent="0">
+              <a:buNone/>
+            </a:pPr>
+            <a:r>
+              <a:rPr lang="it-IT" dirty="0"/>
+              <a:t>Consideriamo quattro differenti modi per agire sul sistema:</a:t>
+            </a:r>
+          </a:p>
+          <a:p>
+            <a:pPr marL="0" indent="0">
+              <a:buNone/>
+            </a:pPr>
+            <a:endParaRPr lang="it-IT" dirty="0"/>
+          </a:p>
+          <a:p>
+            <a:pPr marL="0" indent="0">
+              <a:buNone/>
+            </a:pPr>
+            <a:endParaRPr lang="it-IT" dirty="0"/>
           </a:p>
         </p:txBody>
       </p:sp>
+      <mc:AlternateContent xmlns:mc="http://schemas.openxmlformats.org/markup-compatibility/2006">
+        <mc:Choice xmlns:a14="http://schemas.microsoft.com/office/drawing/2010/main" Requires="a14">
+          <p:graphicFrame>
+            <p:nvGraphicFramePr>
+              <p:cNvPr id="5" name="Tabella 5">
+                <a:extLst>
+                  <a:ext uri="{FF2B5EF4-FFF2-40B4-BE49-F238E27FC236}">
+                    <a16:creationId xmlns:a16="http://schemas.microsoft.com/office/drawing/2014/main" id="{37D3F436-A012-492D-94CE-3D0DC247F361}"/>
+                  </a:ext>
+                </a:extLst>
+              </p:cNvPr>
+              <p:cNvGraphicFramePr>
+                <a:graphicFrameLocks noGrp="1"/>
+              </p:cNvGraphicFramePr>
+              <p:nvPr>
+                <p:extLst>
+                  <p:ext uri="{D42A27DB-BD31-4B8C-83A1-F6EECF244321}">
+                    <p14:modId xmlns:p14="http://schemas.microsoft.com/office/powerpoint/2010/main" val="264041674"/>
+                  </p:ext>
+                </p:extLst>
+              </p:nvPr>
+            </p:nvGraphicFramePr>
+            <p:xfrm>
+              <a:off x="1224132" y="2464435"/>
+              <a:ext cx="8128000" cy="4028440"/>
+            </p:xfrm>
+            <a:graphic>
+              <a:graphicData uri="http://schemas.openxmlformats.org/drawingml/2006/table">
+                <a:tbl>
+                  <a:tblPr firstRow="1" bandRow="1">
+                    <a:tableStyleId>{D7AC3CCA-C797-4891-BE02-D94E43425B78}</a:tableStyleId>
+                  </a:tblPr>
+                  <a:tblGrid>
+                    <a:gridCol w="4064000">
+                      <a:extLst>
+                        <a:ext uri="{9D8B030D-6E8A-4147-A177-3AD203B41FA5}">
+                          <a16:colId xmlns:a16="http://schemas.microsoft.com/office/drawing/2014/main" val="1005857778"/>
+                        </a:ext>
+                      </a:extLst>
+                    </a:gridCol>
+                    <a:gridCol w="4064000">
+                      <a:extLst>
+                        <a:ext uri="{9D8B030D-6E8A-4147-A177-3AD203B41FA5}">
+                          <a16:colId xmlns:a16="http://schemas.microsoft.com/office/drawing/2014/main" val="515276818"/>
+                        </a:ext>
+                      </a:extLst>
+                    </a:gridCol>
+                  </a:tblGrid>
+                  <a:tr h="370840">
+                    <a:tc>
+                      <a:txBody>
+                        <a:bodyPr/>
+                        <a:lstStyle/>
+                        <a:p>
+                          <a:r>
+                            <a:rPr lang="it-IT" dirty="0"/>
+                            <a:t>Variabili di controllo </a:t>
+                          </a:r>
+                        </a:p>
+                      </a:txBody>
+                      <a:tcPr/>
+                    </a:tc>
+                    <a:tc>
+                      <a:txBody>
+                        <a:bodyPr/>
+                        <a:lstStyle/>
+                        <a:p>
+                          <a:r>
+                            <a:rPr lang="it-IT" dirty="0"/>
+                            <a:t>Linea politica applicata</a:t>
+                          </a:r>
+                        </a:p>
+                      </a:txBody>
+                      <a:tcPr/>
+                    </a:tc>
+                    <a:extLst>
+                      <a:ext uri="{0D108BD9-81ED-4DB2-BD59-A6C34878D82A}">
+                        <a16:rowId xmlns:a16="http://schemas.microsoft.com/office/drawing/2014/main" val="70691835"/>
+                      </a:ext>
+                    </a:extLst>
+                  </a:tr>
+                  <a:tr h="370840">
+                    <a:tc>
+                      <a:txBody>
+                        <a:bodyPr/>
+                        <a:lstStyle/>
+                        <a:p>
+                          <a14:m>
+                            <m:oMathPara xmlns:m="http://schemas.openxmlformats.org/officeDocument/2006/math">
+                              <m:oMathParaPr>
+                                <m:jc m:val="centerGroup"/>
+                              </m:oMathParaPr>
+                              <m:oMath xmlns:m="http://schemas.openxmlformats.org/officeDocument/2006/math">
+                                <m:sSub>
+                                  <m:sSubPr>
+                                    <m:ctrlPr>
+                                      <a:rPr lang="it-IT" b="0" i="1" smtClean="0">
+                                        <a:latin typeface="Cambria Math" panose="02040503050406030204" pitchFamily="18" charset="0"/>
+                                      </a:rPr>
+                                    </m:ctrlPr>
+                                  </m:sSubPr>
+                                  <m:e>
+                                    <m:r>
+                                      <a:rPr lang="it-IT" b="0" i="1" smtClean="0">
+                                        <a:latin typeface="Cambria Math" panose="02040503050406030204" pitchFamily="18" charset="0"/>
+                                      </a:rPr>
+                                      <m:t>𝑢</m:t>
+                                    </m:r>
+                                  </m:e>
+                                  <m:sub>
+                                    <m:r>
+                                      <a:rPr lang="it-IT" b="0" i="1" smtClean="0">
+                                        <a:latin typeface="Cambria Math" panose="02040503050406030204" pitchFamily="18" charset="0"/>
+                                      </a:rPr>
+                                      <m:t>𝑝</m:t>
+                                    </m:r>
+                                  </m:sub>
+                                </m:sSub>
+                              </m:oMath>
+                            </m:oMathPara>
+                          </a14:m>
+                          <a:endParaRPr lang="it-IT" dirty="0"/>
+                        </a:p>
+                      </a:txBody>
+                      <a:tcPr/>
+                    </a:tc>
+                    <a:tc>
+                      <a:txBody>
+                        <a:bodyPr/>
+                        <a:lstStyle/>
+                        <a:p>
+                          <a:r>
+                            <a:rPr lang="it-IT" dirty="0"/>
+                            <a:t>Controllo preventivo in riferimento al distanziamento sociale, uso di mascherine, campagne informative preventive, restrizioni </a:t>
+                          </a:r>
+                        </a:p>
+                      </a:txBody>
+                      <a:tcPr/>
+                    </a:tc>
+                    <a:extLst>
+                      <a:ext uri="{0D108BD9-81ED-4DB2-BD59-A6C34878D82A}">
+                        <a16:rowId xmlns:a16="http://schemas.microsoft.com/office/drawing/2014/main" val="2072052118"/>
+                      </a:ext>
+                    </a:extLst>
+                  </a:tr>
+                  <a:tr h="370840">
+                    <a:tc>
+                      <a:txBody>
+                        <a:bodyPr/>
+                        <a:lstStyle/>
+                        <a:p>
+                          <a14:m>
+                            <m:oMathPara xmlns:m="http://schemas.openxmlformats.org/officeDocument/2006/math">
+                              <m:oMathParaPr>
+                                <m:jc m:val="centerGroup"/>
+                              </m:oMathParaPr>
+                              <m:oMath xmlns:m="http://schemas.openxmlformats.org/officeDocument/2006/math">
+                                <m:sSub>
+                                  <m:sSubPr>
+                                    <m:ctrlPr>
+                                      <a:rPr lang="it-IT" b="0" i="1" smtClean="0">
+                                        <a:latin typeface="Cambria Math" panose="02040503050406030204" pitchFamily="18" charset="0"/>
+                                      </a:rPr>
+                                    </m:ctrlPr>
+                                  </m:sSubPr>
+                                  <m:e>
+                                    <m:r>
+                                      <a:rPr lang="it-IT" b="0" i="1" smtClean="0">
+                                        <a:latin typeface="Cambria Math" panose="02040503050406030204" pitchFamily="18" charset="0"/>
+                                      </a:rPr>
+                                      <m:t>𝑢</m:t>
+                                    </m:r>
+                                  </m:e>
+                                  <m:sub>
+                                    <m:r>
+                                      <a:rPr lang="it-IT" b="0" i="1" smtClean="0">
+                                        <a:latin typeface="Cambria Math" panose="02040503050406030204" pitchFamily="18" charset="0"/>
+                                      </a:rPr>
+                                      <m:t>1</m:t>
+                                    </m:r>
+                                  </m:sub>
+                                </m:sSub>
+                              </m:oMath>
+                            </m:oMathPara>
+                          </a14:m>
+                          <a:endParaRPr lang="it-IT" dirty="0"/>
+                        </a:p>
+                      </a:txBody>
+                      <a:tcPr/>
+                    </a:tc>
+                    <a:tc>
+                      <a:txBody>
+                        <a:bodyPr/>
+                        <a:lstStyle/>
+                        <a:p>
+                          <a:r>
+                            <a:rPr lang="it-IT" dirty="0"/>
+                            <a:t>Controllo sugli investimenti rispetto alla cura degli individui infetti ospedalizzati non in TI</a:t>
+                          </a:r>
+                        </a:p>
+                      </a:txBody>
+                      <a:tcPr/>
+                    </a:tc>
+                    <a:extLst>
+                      <a:ext uri="{0D108BD9-81ED-4DB2-BD59-A6C34878D82A}">
+                        <a16:rowId xmlns:a16="http://schemas.microsoft.com/office/drawing/2014/main" val="1130037923"/>
+                      </a:ext>
+                    </a:extLst>
+                  </a:tr>
+                  <a:tr h="370840">
+                    <a:tc>
+                      <a:txBody>
+                        <a:bodyPr/>
+                        <a:lstStyle/>
+                        <a:p>
+                          <a14:m>
+                            <m:oMathPara xmlns:m="http://schemas.openxmlformats.org/officeDocument/2006/math">
+                              <m:oMathParaPr>
+                                <m:jc m:val="centerGroup"/>
+                              </m:oMathParaPr>
+                              <m:oMath xmlns:m="http://schemas.openxmlformats.org/officeDocument/2006/math">
+                                <m:sSub>
+                                  <m:sSubPr>
+                                    <m:ctrlPr>
+                                      <a:rPr lang="it-IT" b="0" i="1" smtClean="0">
+                                        <a:latin typeface="Cambria Math" panose="02040503050406030204" pitchFamily="18" charset="0"/>
+                                      </a:rPr>
+                                    </m:ctrlPr>
+                                  </m:sSubPr>
+                                  <m:e>
+                                    <m:r>
+                                      <a:rPr lang="it-IT" b="0" i="1" smtClean="0">
+                                        <a:latin typeface="Cambria Math" panose="02040503050406030204" pitchFamily="18" charset="0"/>
+                                      </a:rPr>
+                                      <m:t>𝑢</m:t>
+                                    </m:r>
+                                  </m:e>
+                                  <m:sub>
+                                    <m:r>
+                                      <a:rPr lang="it-IT" b="0" i="1" smtClean="0">
+                                        <a:latin typeface="Cambria Math" panose="02040503050406030204" pitchFamily="18" charset="0"/>
+                                      </a:rPr>
+                                      <m:t>2</m:t>
+                                    </m:r>
+                                  </m:sub>
+                                </m:sSub>
+                              </m:oMath>
+                            </m:oMathPara>
+                          </a14:m>
+                          <a:endParaRPr lang="it-IT" dirty="0"/>
+                        </a:p>
+                      </a:txBody>
+                      <a:tcPr/>
+                    </a:tc>
+                    <a:tc>
+                      <a:txBody>
+                        <a:bodyPr/>
+                        <a:lstStyle/>
+                        <a:p>
+                          <a:r>
+                            <a:rPr lang="it-IT" dirty="0"/>
+                            <a:t>Controllo sugli investimenti rispetto alla cura degli individui infetti ospedalizzati in TI</a:t>
+                          </a:r>
+                        </a:p>
+                      </a:txBody>
+                      <a:tcPr/>
+                    </a:tc>
+                    <a:extLst>
+                      <a:ext uri="{0D108BD9-81ED-4DB2-BD59-A6C34878D82A}">
+                        <a16:rowId xmlns:a16="http://schemas.microsoft.com/office/drawing/2014/main" val="3329125353"/>
+                      </a:ext>
+                    </a:extLst>
+                  </a:tr>
+                  <a:tr h="370840">
+                    <a:tc>
+                      <a:txBody>
+                        <a:bodyPr/>
+                        <a:lstStyle/>
+                        <a:p>
+                          <a14:m>
+                            <m:oMathPara xmlns:m="http://schemas.openxmlformats.org/officeDocument/2006/math">
+                              <m:oMathParaPr>
+                                <m:jc m:val="centerGroup"/>
+                              </m:oMathParaPr>
+                              <m:oMath xmlns:m="http://schemas.openxmlformats.org/officeDocument/2006/math">
+                                <m:sSub>
+                                  <m:sSubPr>
+                                    <m:ctrlPr>
+                                      <a:rPr lang="it-IT" b="0" i="1" smtClean="0">
+                                        <a:latin typeface="Cambria Math" panose="02040503050406030204" pitchFamily="18" charset="0"/>
+                                      </a:rPr>
+                                    </m:ctrlPr>
+                                  </m:sSubPr>
+                                  <m:e>
+                                    <m:r>
+                                      <a:rPr lang="it-IT" b="0" i="1" smtClean="0">
+                                        <a:latin typeface="Cambria Math" panose="02040503050406030204" pitchFamily="18" charset="0"/>
+                                      </a:rPr>
+                                      <m:t>𝑢</m:t>
+                                    </m:r>
+                                  </m:e>
+                                  <m:sub>
+                                    <m:r>
+                                      <a:rPr lang="it-IT" b="0" i="1" smtClean="0">
+                                        <a:latin typeface="Cambria Math" panose="02040503050406030204" pitchFamily="18" charset="0"/>
+                                      </a:rPr>
+                                      <m:t>𝑣𝑎</m:t>
+                                    </m:r>
+                                  </m:sub>
+                                </m:sSub>
+                              </m:oMath>
+                            </m:oMathPara>
+                          </a14:m>
+                          <a:endParaRPr lang="it-IT" dirty="0"/>
+                        </a:p>
+                      </a:txBody>
+                      <a:tcPr/>
+                    </a:tc>
+                    <a:tc>
+                      <a:txBody>
+                        <a:bodyPr/>
+                        <a:lstStyle/>
+                        <a:p>
+                          <a:r>
+                            <a:rPr lang="it-IT" dirty="0"/>
+                            <a:t>Controllo sugli investimenti rispetto al vaccino </a:t>
+                          </a:r>
+                        </a:p>
+                      </a:txBody>
+                      <a:tcPr/>
+                    </a:tc>
+                    <a:extLst>
+                      <a:ext uri="{0D108BD9-81ED-4DB2-BD59-A6C34878D82A}">
+                        <a16:rowId xmlns:a16="http://schemas.microsoft.com/office/drawing/2014/main" val="2619933187"/>
+                      </a:ext>
+                    </a:extLst>
+                  </a:tr>
+                </a:tbl>
+              </a:graphicData>
+            </a:graphic>
+          </p:graphicFrame>
+        </mc:Choice>
+        <mc:Fallback>
+          <p:graphicFrame>
+            <p:nvGraphicFramePr>
+              <p:cNvPr id="5" name="Tabella 5">
+                <a:extLst>
+                  <a:ext uri="{FF2B5EF4-FFF2-40B4-BE49-F238E27FC236}">
+                    <a16:creationId xmlns:a16="http://schemas.microsoft.com/office/drawing/2014/main" id="{37D3F436-A012-492D-94CE-3D0DC247F361}"/>
+                  </a:ext>
+                </a:extLst>
+              </p:cNvPr>
+              <p:cNvGraphicFramePr>
+                <a:graphicFrameLocks noGrp="1"/>
+              </p:cNvGraphicFramePr>
+              <p:nvPr>
+                <p:extLst>
+                  <p:ext uri="{D42A27DB-BD31-4B8C-83A1-F6EECF244321}">
+                    <p14:modId xmlns:p14="http://schemas.microsoft.com/office/powerpoint/2010/main" val="264041674"/>
+                  </p:ext>
+                </p:extLst>
+              </p:nvPr>
+            </p:nvGraphicFramePr>
+            <p:xfrm>
+              <a:off x="1224132" y="2464435"/>
+              <a:ext cx="8128000" cy="4028440"/>
+            </p:xfrm>
+            <a:graphic>
+              <a:graphicData uri="http://schemas.openxmlformats.org/drawingml/2006/table">
+                <a:tbl>
+                  <a:tblPr firstRow="1" bandRow="1">
+                    <a:tableStyleId>{D7AC3CCA-C797-4891-BE02-D94E43425B78}</a:tableStyleId>
+                  </a:tblPr>
+                  <a:tblGrid>
+                    <a:gridCol w="4064000">
+                      <a:extLst>
+                        <a:ext uri="{9D8B030D-6E8A-4147-A177-3AD203B41FA5}">
+                          <a16:colId xmlns:a16="http://schemas.microsoft.com/office/drawing/2014/main" val="1005857778"/>
+                        </a:ext>
+                      </a:extLst>
+                    </a:gridCol>
+                    <a:gridCol w="4064000">
+                      <a:extLst>
+                        <a:ext uri="{9D8B030D-6E8A-4147-A177-3AD203B41FA5}">
+                          <a16:colId xmlns:a16="http://schemas.microsoft.com/office/drawing/2014/main" val="515276818"/>
+                        </a:ext>
+                      </a:extLst>
+                    </a:gridCol>
+                  </a:tblGrid>
+                  <a:tr h="370840">
+                    <a:tc>
+                      <a:txBody>
+                        <a:bodyPr/>
+                        <a:lstStyle/>
+                        <a:p>
+                          <a:r>
+                            <a:rPr lang="it-IT" dirty="0"/>
+                            <a:t>Variabili di controllo </a:t>
+                          </a:r>
+                        </a:p>
+                      </a:txBody>
+                      <a:tcPr/>
+                    </a:tc>
+                    <a:tc>
+                      <a:txBody>
+                        <a:bodyPr/>
+                        <a:lstStyle/>
+                        <a:p>
+                          <a:r>
+                            <a:rPr lang="it-IT" dirty="0"/>
+                            <a:t>Linea politica applicata</a:t>
+                          </a:r>
+                        </a:p>
+                      </a:txBody>
+                      <a:tcPr/>
+                    </a:tc>
+                    <a:extLst>
+                      <a:ext uri="{0D108BD9-81ED-4DB2-BD59-A6C34878D82A}">
+                        <a16:rowId xmlns:a16="http://schemas.microsoft.com/office/drawing/2014/main" val="70691835"/>
+                      </a:ext>
+                    </a:extLst>
+                  </a:tr>
+                  <a:tr h="1188720">
+                    <a:tc>
+                      <a:txBody>
+                        <a:bodyPr/>
+                        <a:lstStyle/>
+                        <a:p>
+                          <a:endParaRPr lang="it-IT"/>
+                        </a:p>
+                      </a:txBody>
+                      <a:tcPr>
+                        <a:blipFill>
+                          <a:blip r:embed="rId2"/>
+                          <a:stretch>
+                            <a:fillRect l="-150" t="-33846" r="-100150" b="-215897"/>
+                          </a:stretch>
+                        </a:blipFill>
+                      </a:tcPr>
+                    </a:tc>
+                    <a:tc>
+                      <a:txBody>
+                        <a:bodyPr/>
+                        <a:lstStyle/>
+                        <a:p>
+                          <a:r>
+                            <a:rPr lang="it-IT" dirty="0"/>
+                            <a:t>Controllo preventivo in riferimento al distanziamento sociale, uso di mascherine, campagne informative preventive, restrizioni </a:t>
+                          </a:r>
+                        </a:p>
+                      </a:txBody>
+                      <a:tcPr/>
+                    </a:tc>
+                    <a:extLst>
+                      <a:ext uri="{0D108BD9-81ED-4DB2-BD59-A6C34878D82A}">
+                        <a16:rowId xmlns:a16="http://schemas.microsoft.com/office/drawing/2014/main" val="2072052118"/>
+                      </a:ext>
+                    </a:extLst>
+                  </a:tr>
+                  <a:tr h="914400">
+                    <a:tc>
+                      <a:txBody>
+                        <a:bodyPr/>
+                        <a:lstStyle/>
+                        <a:p>
+                          <a:endParaRPr lang="it-IT"/>
+                        </a:p>
+                      </a:txBody>
+                      <a:tcPr>
+                        <a:blipFill>
+                          <a:blip r:embed="rId2"/>
+                          <a:stretch>
+                            <a:fillRect l="-150" t="-172848" r="-100150" b="-178808"/>
+                          </a:stretch>
+                        </a:blipFill>
+                      </a:tcPr>
+                    </a:tc>
+                    <a:tc>
+                      <a:txBody>
+                        <a:bodyPr/>
+                        <a:lstStyle/>
+                        <a:p>
+                          <a:r>
+                            <a:rPr lang="it-IT" dirty="0"/>
+                            <a:t>Controllo sugli investimenti rispetto alla cura degli individui infetti ospedalizzati non in TI</a:t>
+                          </a:r>
+                        </a:p>
+                      </a:txBody>
+                      <a:tcPr/>
+                    </a:tc>
+                    <a:extLst>
+                      <a:ext uri="{0D108BD9-81ED-4DB2-BD59-A6C34878D82A}">
+                        <a16:rowId xmlns:a16="http://schemas.microsoft.com/office/drawing/2014/main" val="1130037923"/>
+                      </a:ext>
+                    </a:extLst>
+                  </a:tr>
+                  <a:tr h="914400">
+                    <a:tc>
+                      <a:txBody>
+                        <a:bodyPr/>
+                        <a:lstStyle/>
+                        <a:p>
+                          <a:endParaRPr lang="it-IT"/>
+                        </a:p>
+                      </a:txBody>
+                      <a:tcPr>
+                        <a:blipFill>
+                          <a:blip r:embed="rId2"/>
+                          <a:stretch>
+                            <a:fillRect l="-150" t="-274667" r="-100150" b="-80000"/>
+                          </a:stretch>
+                        </a:blipFill>
+                      </a:tcPr>
+                    </a:tc>
+                    <a:tc>
+                      <a:txBody>
+                        <a:bodyPr/>
+                        <a:lstStyle/>
+                        <a:p>
+                          <a:r>
+                            <a:rPr lang="it-IT" dirty="0"/>
+                            <a:t>Controllo sugli investimenti rispetto alla cura degli individui infetti ospedalizzati in TI</a:t>
+                          </a:r>
+                        </a:p>
+                      </a:txBody>
+                      <a:tcPr/>
+                    </a:tc>
+                    <a:extLst>
+                      <a:ext uri="{0D108BD9-81ED-4DB2-BD59-A6C34878D82A}">
+                        <a16:rowId xmlns:a16="http://schemas.microsoft.com/office/drawing/2014/main" val="3329125353"/>
+                      </a:ext>
+                    </a:extLst>
+                  </a:tr>
+                  <a:tr h="640080">
+                    <a:tc>
+                      <a:txBody>
+                        <a:bodyPr/>
+                        <a:lstStyle/>
+                        <a:p>
+                          <a:endParaRPr lang="it-IT"/>
+                        </a:p>
+                      </a:txBody>
+                      <a:tcPr>
+                        <a:blipFill>
+                          <a:blip r:embed="rId2"/>
+                          <a:stretch>
+                            <a:fillRect l="-150" t="-535238" r="-100150" b="-14286"/>
+                          </a:stretch>
+                        </a:blipFill>
+                      </a:tcPr>
+                    </a:tc>
+                    <a:tc>
+                      <a:txBody>
+                        <a:bodyPr/>
+                        <a:lstStyle/>
+                        <a:p>
+                          <a:r>
+                            <a:rPr lang="it-IT" dirty="0"/>
+                            <a:t>Controllo sugli investimenti rispetto al vaccino </a:t>
+                          </a:r>
+                        </a:p>
+                      </a:txBody>
+                      <a:tcPr/>
+                    </a:tc>
+                    <a:extLst>
+                      <a:ext uri="{0D108BD9-81ED-4DB2-BD59-A6C34878D82A}">
+                        <a16:rowId xmlns:a16="http://schemas.microsoft.com/office/drawing/2014/main" val="2619933187"/>
+                      </a:ext>
+                    </a:extLst>
+                  </a:tr>
+                </a:tbl>
+              </a:graphicData>
+            </a:graphic>
+          </p:graphicFrame>
+        </mc:Fallback>
+      </mc:AlternateContent>
     </p:spTree>
     <p:extLst>
       <p:ext uri="{BB962C8B-B14F-4D97-AF65-F5344CB8AC3E}">
@@ -14650,13 +16507,13 @@
           <a:p>
             <a:r>
               <a:rPr lang="it-IT" dirty="0"/>
-              <a:t>Prima strategia: minimizzare direttamente gli ospedalizzati e la terapia intensiva</a:t>
+              <a:t>Prima strategia: massimizzare i suscettibili</a:t>
             </a:r>
           </a:p>
           <a:p>
             <a:r>
               <a:rPr lang="it-IT" dirty="0"/>
-              <a:t>Seconda strategia: massimizzare i suscettibili </a:t>
+              <a:t>Seconda strategia: minimizzare direttamente gli ospedalizzati e la terapia intensiva</a:t>
             </a:r>
           </a:p>
           <a:p>

</xml_diff>

<commit_message>
Modifiche powerpoint e FminCon
</commit_message>
<xml_diff>
--- a/PowerPoint/Optimal control strategies to prevent the hospital beds collapse during COVID-19 outbreak.pptx
+++ b/PowerPoint/Optimal control strategies to prevent the hospital beds collapse during COVID-19 outbreak.pptx
@@ -277,7 +277,7 @@
           <a:p>
             <a:fld id="{32F30997-0925-4C0B-8C7A-0B9D8E6111C4}" type="datetimeFigureOut">
               <a:rPr lang="it-IT" smtClean="0"/>
-              <a:t>20/02/2021</a:t>
+              <a:t>24/02/2021</a:t>
             </a:fld>
             <a:endParaRPr lang="it-IT"/>
           </a:p>
@@ -475,7 +475,7 @@
           <a:p>
             <a:fld id="{32F30997-0925-4C0B-8C7A-0B9D8E6111C4}" type="datetimeFigureOut">
               <a:rPr lang="it-IT" smtClean="0"/>
-              <a:t>20/02/2021</a:t>
+              <a:t>24/02/2021</a:t>
             </a:fld>
             <a:endParaRPr lang="it-IT"/>
           </a:p>
@@ -683,7 +683,7 @@
           <a:p>
             <a:fld id="{32F30997-0925-4C0B-8C7A-0B9D8E6111C4}" type="datetimeFigureOut">
               <a:rPr lang="it-IT" smtClean="0"/>
-              <a:t>20/02/2021</a:t>
+              <a:t>24/02/2021</a:t>
             </a:fld>
             <a:endParaRPr lang="it-IT"/>
           </a:p>
@@ -881,7 +881,7 @@
           <a:p>
             <a:fld id="{32F30997-0925-4C0B-8C7A-0B9D8E6111C4}" type="datetimeFigureOut">
               <a:rPr lang="it-IT" smtClean="0"/>
-              <a:t>20/02/2021</a:t>
+              <a:t>24/02/2021</a:t>
             </a:fld>
             <a:endParaRPr lang="it-IT"/>
           </a:p>
@@ -1156,7 +1156,7 @@
           <a:p>
             <a:fld id="{32F30997-0925-4C0B-8C7A-0B9D8E6111C4}" type="datetimeFigureOut">
               <a:rPr lang="it-IT" smtClean="0"/>
-              <a:t>20/02/2021</a:t>
+              <a:t>24/02/2021</a:t>
             </a:fld>
             <a:endParaRPr lang="it-IT"/>
           </a:p>
@@ -1421,7 +1421,7 @@
           <a:p>
             <a:fld id="{32F30997-0925-4C0B-8C7A-0B9D8E6111C4}" type="datetimeFigureOut">
               <a:rPr lang="it-IT" smtClean="0"/>
-              <a:t>20/02/2021</a:t>
+              <a:t>24/02/2021</a:t>
             </a:fld>
             <a:endParaRPr lang="it-IT"/>
           </a:p>
@@ -1833,7 +1833,7 @@
           <a:p>
             <a:fld id="{32F30997-0925-4C0B-8C7A-0B9D8E6111C4}" type="datetimeFigureOut">
               <a:rPr lang="it-IT" smtClean="0"/>
-              <a:t>20/02/2021</a:t>
+              <a:t>24/02/2021</a:t>
             </a:fld>
             <a:endParaRPr lang="it-IT"/>
           </a:p>
@@ -1974,7 +1974,7 @@
           <a:p>
             <a:fld id="{32F30997-0925-4C0B-8C7A-0B9D8E6111C4}" type="datetimeFigureOut">
               <a:rPr lang="it-IT" smtClean="0"/>
-              <a:t>20/02/2021</a:t>
+              <a:t>24/02/2021</a:t>
             </a:fld>
             <a:endParaRPr lang="it-IT"/>
           </a:p>
@@ -2087,7 +2087,7 @@
           <a:p>
             <a:fld id="{32F30997-0925-4C0B-8C7A-0B9D8E6111C4}" type="datetimeFigureOut">
               <a:rPr lang="it-IT" smtClean="0"/>
-              <a:t>20/02/2021</a:t>
+              <a:t>24/02/2021</a:t>
             </a:fld>
             <a:endParaRPr lang="it-IT"/>
           </a:p>
@@ -2398,7 +2398,7 @@
           <a:p>
             <a:fld id="{32F30997-0925-4C0B-8C7A-0B9D8E6111C4}" type="datetimeFigureOut">
               <a:rPr lang="it-IT" smtClean="0"/>
-              <a:t>20/02/2021</a:t>
+              <a:t>24/02/2021</a:t>
             </a:fld>
             <a:endParaRPr lang="it-IT"/>
           </a:p>
@@ -2686,7 +2686,7 @@
           <a:p>
             <a:fld id="{32F30997-0925-4C0B-8C7A-0B9D8E6111C4}" type="datetimeFigureOut">
               <a:rPr lang="it-IT" smtClean="0"/>
-              <a:t>20/02/2021</a:t>
+              <a:t>24/02/2021</a:t>
             </a:fld>
             <a:endParaRPr lang="it-IT"/>
           </a:p>
@@ -2927,7 +2927,7 @@
           <a:p>
             <a:fld id="{32F30997-0925-4C0B-8C7A-0B9D8E6111C4}" type="datetimeFigureOut">
               <a:rPr lang="it-IT" smtClean="0"/>
-              <a:t>20/02/2021</a:t>
+              <a:t>24/02/2021</a:t>
             </a:fld>
             <a:endParaRPr lang="it-IT"/>
           </a:p>
@@ -3461,7 +3461,12 @@
             <p:ph type="title"/>
           </p:nvPr>
         </p:nvSpPr>
-        <p:spPr/>
+        <p:spPr>
+          <a:xfrm>
+            <a:off x="838200" y="365126"/>
+            <a:ext cx="5083206" cy="1249362"/>
+          </a:xfrm>
+        </p:spPr>
         <p:txBody>
           <a:bodyPr/>
           <a:lstStyle/>
@@ -3473,8 +3478,8 @@
           </a:p>
         </p:txBody>
       </p:sp>
-      <mc:AlternateContent xmlns:mc="http://schemas.openxmlformats.org/markup-compatibility/2006">
-        <mc:Choice xmlns:a14="http://schemas.microsoft.com/office/drawing/2010/main" Requires="a14">
+      <mc:AlternateContent xmlns:mc="http://schemas.openxmlformats.org/markup-compatibility/2006" xmlns:a14="http://schemas.microsoft.com/office/drawing/2010/main">
+        <mc:Choice Requires="a14">
           <p:sp>
             <p:nvSpPr>
               <p:cNvPr id="4" name="CasellaDiTesto 3">
@@ -4718,7 +4723,7 @@
             </p:txBody>
           </p:sp>
         </mc:Choice>
-        <mc:Fallback>
+        <mc:Fallback xmlns="">
           <p:sp>
             <p:nvSpPr>
               <p:cNvPr id="4" name="CasellaDiTesto 3">
@@ -4763,6 +4768,60 @@
           </p:sp>
         </mc:Fallback>
       </mc:AlternateContent>
+      <p:sp>
+        <p:nvSpPr>
+          <p:cNvPr id="5" name="Titolo 1">
+            <a:extLst>
+              <a:ext uri="{FF2B5EF4-FFF2-40B4-BE49-F238E27FC236}">
+                <a16:creationId xmlns:a16="http://schemas.microsoft.com/office/drawing/2014/main" id="{9C849199-9D83-4711-9228-9C64DB5AB31E}"/>
+              </a:ext>
+            </a:extLst>
+          </p:cNvPr>
+          <p:cNvSpPr txBox="1">
+            <a:spLocks/>
+          </p:cNvSpPr>
+          <p:nvPr/>
+        </p:nvSpPr>
+        <p:spPr>
+          <a:xfrm>
+            <a:off x="6570185" y="441324"/>
+            <a:ext cx="5179381" cy="1173163"/>
+          </a:xfrm>
+          <a:prstGeom prst="rect">
+            <a:avLst/>
+          </a:prstGeom>
+        </p:spPr>
+        <p:txBody>
+          <a:bodyPr vert="horz" lIns="91440" tIns="45720" rIns="91440" bIns="45720" rtlCol="0" anchor="ctr">
+            <a:normAutofit/>
+          </a:bodyPr>
+          <a:lstStyle>
+            <a:lvl1pPr algn="l" defTabSz="914400" rtl="0" eaLnBrk="1" latinLnBrk="0" hangingPunct="1">
+              <a:lnSpc>
+                <a:spcPct val="90000"/>
+              </a:lnSpc>
+              <a:spcBef>
+                <a:spcPct val="0"/>
+              </a:spcBef>
+              <a:buNone/>
+              <a:defRPr sz="4400" kern="1200">
+                <a:solidFill>
+                  <a:schemeClr val="tx1"/>
+                </a:solidFill>
+                <a:latin typeface="+mj-lt"/>
+                <a:ea typeface="+mj-ea"/>
+                <a:cs typeface="+mj-cs"/>
+              </a:defRPr>
+            </a:lvl1pPr>
+          </a:lstStyle>
+          <a:p>
+            <a:r>
+              <a:rPr lang="it-IT" dirty="0"/>
+              <a:t>Vincoli</a:t>
+            </a:r>
+          </a:p>
+        </p:txBody>
+      </p:sp>
     </p:spTree>
     <p:extLst>
       <p:ext uri="{BB962C8B-B14F-4D97-AF65-F5344CB8AC3E}">
@@ -5577,8 +5636,8 @@
           <a:chExt cx="0" cy="0"/>
         </a:xfrm>
       </p:grpSpPr>
-      <mc:AlternateContent xmlns:mc="http://schemas.openxmlformats.org/markup-compatibility/2006" xmlns:a14="http://schemas.microsoft.com/office/drawing/2010/main">
-        <mc:Choice Requires="a14">
+      <mc:AlternateContent xmlns:mc="http://schemas.openxmlformats.org/markup-compatibility/2006">
+        <mc:Choice xmlns:a14="http://schemas.microsoft.com/office/drawing/2010/main" Requires="a14">
           <p:sp>
             <p:nvSpPr>
               <p:cNvPr id="4" name="CasellaDiTesto 3">
@@ -5618,14 +5677,14 @@
                         <m:accPr>
                           <m:chr m:val="̇"/>
                           <m:ctrlPr>
-                            <a:rPr lang="it-IT" sz="2400" i="1" u="sng" smtClean="0">
+                            <a:rPr lang="it-IT" sz="2400" i="1" smtClean="0">
                               <a:latin typeface="Cambria Math" panose="02040503050406030204" pitchFamily="18" charset="0"/>
                             </a:rPr>
                           </m:ctrlPr>
                         </m:accPr>
                         <m:e>
                           <m:r>
-                            <a:rPr lang="it-IT" sz="2400" b="0" i="1" u="sng" smtClean="0">
+                            <a:rPr lang="it-IT" sz="2400" b="0" i="1" smtClean="0">
                               <a:latin typeface="Cambria Math" panose="02040503050406030204" pitchFamily="18" charset="0"/>
                             </a:rPr>
                             <m:t>𝑆</m:t>
@@ -5633,44 +5692,44 @@
                         </m:e>
                       </m:acc>
                       <m:r>
-                        <a:rPr lang="it-IT" sz="2400" b="0" i="1" u="sng" smtClean="0">
+                        <a:rPr lang="it-IT" sz="2400" b="0" i="1" smtClean="0">
                           <a:latin typeface="Cambria Math" panose="02040503050406030204" pitchFamily="18" charset="0"/>
                         </a:rPr>
                         <m:t>=</m:t>
                       </m:r>
                       <m:r>
-                        <a:rPr lang="it-IT" sz="2400" b="0" i="1" u="sng" smtClean="0">
+                        <a:rPr lang="it-IT" sz="2400" b="0" i="1" smtClean="0">
                           <a:latin typeface="Cambria Math" panose="02040503050406030204" pitchFamily="18" charset="0"/>
                         </a:rPr>
                         <m:t>𝑏</m:t>
                       </m:r>
                       <m:r>
-                        <a:rPr lang="it-IT" sz="2400" b="0" i="1" u="sng" smtClean="0">
+                        <a:rPr lang="it-IT" sz="2400" b="0" i="1" smtClean="0">
                           <a:latin typeface="Cambria Math" panose="02040503050406030204" pitchFamily="18" charset="0"/>
                         </a:rPr>
                         <m:t>−</m:t>
                       </m:r>
                       <m:r>
-                        <a:rPr lang="it-IT" sz="2400" b="0" i="1" u="sng" smtClean="0">
+                        <a:rPr lang="it-IT" sz="2400" b="0" i="1" smtClean="0">
                           <a:latin typeface="Cambria Math" panose="02040503050406030204" pitchFamily="18" charset="0"/>
                         </a:rPr>
                         <m:t>𝑑𝑆</m:t>
                       </m:r>
                       <m:r>
-                        <a:rPr lang="it-IT" sz="2400" b="0" i="1" u="sng" smtClean="0">
+                        <a:rPr lang="it-IT" sz="2400" b="0" i="1" smtClean="0">
                           <a:latin typeface="Cambria Math" panose="02040503050406030204" pitchFamily="18" charset="0"/>
                         </a:rPr>
                         <m:t>−</m:t>
                       </m:r>
                       <m:r>
-                        <a:rPr lang="it-IT" sz="2400" i="1" u="sng">
+                        <a:rPr lang="it-IT" sz="2400" i="1">
                           <a:latin typeface="Cambria Math" panose="02040503050406030204" pitchFamily="18" charset="0"/>
                           <a:ea typeface="Cambria Math" panose="02040503050406030204" pitchFamily="18" charset="0"/>
                         </a:rPr>
                         <m:t>𝛽</m:t>
                       </m:r>
                       <m:r>
-                        <a:rPr lang="it-IT" sz="2400" b="0" i="1" u="sng" smtClean="0">
+                        <a:rPr lang="it-IT" sz="2400" b="0" i="1" smtClean="0">
                           <a:latin typeface="Cambria Math" panose="02040503050406030204" pitchFamily="18" charset="0"/>
                         </a:rPr>
                         <m:t>𝑆</m:t>
@@ -5678,14 +5737,14 @@
                       <m:sSub>
                         <m:sSubPr>
                           <m:ctrlPr>
-                            <a:rPr lang="it-IT" sz="2400" i="1" u="sng">
+                            <a:rPr lang="it-IT" sz="2400" i="1">
                               <a:latin typeface="Cambria Math" panose="02040503050406030204" pitchFamily="18" charset="0"/>
                             </a:rPr>
                           </m:ctrlPr>
                         </m:sSubPr>
                         <m:e>
                           <m:r>
-                            <a:rPr lang="it-IT" sz="2400" i="1" u="sng">
+                            <a:rPr lang="it-IT" sz="2400" i="1">
                               <a:latin typeface="Cambria Math" panose="02040503050406030204" pitchFamily="18" charset="0"/>
                             </a:rPr>
                             <m:t>𝐼</m:t>
@@ -5693,7 +5752,7 @@
                         </m:e>
                         <m:sub>
                           <m:r>
-                            <a:rPr lang="it-IT" sz="2400" b="0" i="1" u="sng" smtClean="0">
+                            <a:rPr lang="it-IT" sz="2400" b="0" i="1" smtClean="0">
                               <a:latin typeface="Cambria Math" panose="02040503050406030204" pitchFamily="18" charset="0"/>
                             </a:rPr>
                             <m:t>𝑎</m:t>
@@ -5703,14 +5762,14 @@
                       <m:d>
                         <m:dPr>
                           <m:ctrlPr>
-                            <a:rPr lang="it-IT" sz="2400" b="0" i="1" u="sng" smtClean="0">
+                            <a:rPr lang="it-IT" sz="2400" b="0" i="1" smtClean="0">
                               <a:latin typeface="Cambria Math" panose="02040503050406030204" pitchFamily="18" charset="0"/>
                             </a:rPr>
                           </m:ctrlPr>
                         </m:dPr>
                         <m:e>
                           <m:r>
-                            <a:rPr lang="it-IT" sz="2400" b="0" i="1" u="sng" smtClean="0">
+                            <a:rPr lang="it-IT" sz="2400" b="0" i="1" smtClean="0">
                               <a:latin typeface="Cambria Math" panose="02040503050406030204" pitchFamily="18" charset="0"/>
                             </a:rPr>
                             <m:t>1−</m:t>
@@ -5718,14 +5777,14 @@
                           <m:sSub>
                             <m:sSubPr>
                               <m:ctrlPr>
-                                <a:rPr lang="it-IT" sz="2400" b="0" i="1" u="sng" smtClean="0">
+                                <a:rPr lang="it-IT" sz="2400" b="0" i="1" smtClean="0">
                                   <a:latin typeface="Cambria Math" panose="02040503050406030204" pitchFamily="18" charset="0"/>
                                 </a:rPr>
                               </m:ctrlPr>
                             </m:sSubPr>
                             <m:e>
                               <m:r>
-                                <a:rPr lang="it-IT" sz="2400" b="0" i="1" u="sng" smtClean="0">
+                                <a:rPr lang="it-IT" sz="2400" b="0" i="1" smtClean="0">
                                   <a:latin typeface="Cambria Math" panose="02040503050406030204" pitchFamily="18" charset="0"/>
                                 </a:rPr>
                                 <m:t>𝑢</m:t>
@@ -5733,7 +5792,7 @@
                             </m:e>
                             <m:sub>
                               <m:r>
-                                <a:rPr lang="it-IT" sz="2400" b="0" i="1" u="sng" smtClean="0">
+                                <a:rPr lang="it-IT" sz="2400" b="0" i="1" smtClean="0">
                                   <a:latin typeface="Cambria Math" panose="02040503050406030204" pitchFamily="18" charset="0"/>
                                 </a:rPr>
                                 <m:t>𝑝</m:t>
@@ -5743,27 +5802,27 @@
                         </m:e>
                       </m:d>
                       <m:r>
-                        <a:rPr lang="it-IT" sz="2400" b="0" i="1" u="sng" smtClean="0">
+                        <a:rPr lang="it-IT" sz="2400" b="0" i="1" smtClean="0">
                           <a:latin typeface="Cambria Math" panose="02040503050406030204" pitchFamily="18" charset="0"/>
                         </a:rPr>
                         <m:t>+</m:t>
                       </m:r>
                       <m:r>
-                        <a:rPr lang="it-IT" sz="2400" b="0" i="1" u="sng" smtClean="0">
+                        <a:rPr lang="it-IT" sz="2400" b="0" i="1" smtClean="0">
                           <a:latin typeface="Cambria Math" panose="02040503050406030204" pitchFamily="18" charset="0"/>
                           <a:ea typeface="Cambria Math" panose="02040503050406030204" pitchFamily="18" charset="0"/>
                         </a:rPr>
                         <m:t>𝜂</m:t>
                       </m:r>
                       <m:r>
-                        <a:rPr lang="it-IT" sz="2400" b="0" i="1" u="sng" smtClean="0">
+                        <a:rPr lang="it-IT" sz="2400" b="0" i="1" smtClean="0">
                           <a:latin typeface="Cambria Math" panose="02040503050406030204" pitchFamily="18" charset="0"/>
                           <a:ea typeface="Cambria Math" panose="02040503050406030204" pitchFamily="18" charset="0"/>
                         </a:rPr>
                         <m:t>𝑅</m:t>
                       </m:r>
                       <m:r>
-                        <a:rPr lang="it-IT" sz="2400" b="0" i="1" u="sng" smtClean="0">
+                        <a:rPr lang="it-IT" sz="2400" b="0" i="1" smtClean="0">
                           <a:latin typeface="Cambria Math" panose="02040503050406030204" pitchFamily="18" charset="0"/>
                           <a:ea typeface="Cambria Math" panose="02040503050406030204" pitchFamily="18" charset="0"/>
                         </a:rPr>
@@ -5772,7 +5831,7 @@
                       <m:sSub>
                         <m:sSubPr>
                           <m:ctrlPr>
-                            <a:rPr lang="it-IT" sz="2400" b="0" i="1" u="sng" smtClean="0">
+                            <a:rPr lang="it-IT" sz="2400" b="0" i="1" smtClean="0">
                               <a:latin typeface="Cambria Math" panose="02040503050406030204" pitchFamily="18" charset="0"/>
                               <a:ea typeface="Cambria Math" panose="02040503050406030204" pitchFamily="18" charset="0"/>
                             </a:rPr>
@@ -5780,7 +5839,7 @@
                         </m:sSubPr>
                         <m:e>
                           <m:r>
-                            <a:rPr lang="it-IT" sz="2400" b="0" i="1" u="sng" smtClean="0">
+                            <a:rPr lang="it-IT" sz="2400" b="0" i="1" smtClean="0">
                               <a:latin typeface="Cambria Math" panose="02040503050406030204" pitchFamily="18" charset="0"/>
                               <a:ea typeface="Cambria Math" panose="02040503050406030204" pitchFamily="18" charset="0"/>
                             </a:rPr>
@@ -5789,7 +5848,7 @@
                         </m:e>
                         <m:sub>
                           <m:r>
-                            <a:rPr lang="it-IT" sz="2400" b="0" i="1" u="sng" smtClean="0">
+                            <a:rPr lang="it-IT" sz="2400" b="0" i="1" smtClean="0">
                               <a:latin typeface="Cambria Math" panose="02040503050406030204" pitchFamily="18" charset="0"/>
                               <a:ea typeface="Cambria Math" panose="02040503050406030204" pitchFamily="18" charset="0"/>
                             </a:rPr>
@@ -5798,7 +5857,7 @@
                         </m:sub>
                       </m:sSub>
                       <m:r>
-                        <a:rPr lang="it-IT" sz="2400" b="0" i="1" u="sng" smtClean="0">
+                        <a:rPr lang="it-IT" sz="2400" b="0" i="1" smtClean="0">
                           <a:latin typeface="Cambria Math" panose="02040503050406030204" pitchFamily="18" charset="0"/>
                           <a:ea typeface="Cambria Math" panose="02040503050406030204" pitchFamily="18" charset="0"/>
                         </a:rPr>
@@ -5807,7 +5866,7 @@
                     </m:oMath>
                   </m:oMathPara>
                 </a14:m>
-                <a:endParaRPr lang="it-IT" sz="2400" u="sng" dirty="0"/>
+                <a:endParaRPr lang="it-IT" sz="2400" dirty="0"/>
               </a:p>
               <a:p>
                 <a:pPr/>
@@ -7378,7 +7437,7 @@
                       <m:sSub>
                         <m:sSubPr>
                           <m:ctrlPr>
-                            <a:rPr lang="it-IT" sz="2400" i="1" smtClean="0">
+                            <a:rPr lang="it-IT" sz="2400" b="0" i="1" smtClean="0">
                               <a:latin typeface="Cambria Math" panose="02040503050406030204" pitchFamily="18" charset="0"/>
                             </a:rPr>
                           </m:ctrlPr>
@@ -7388,7 +7447,7 @@
                             <a:rPr lang="it-IT" sz="2400" b="0" i="1" smtClean="0">
                               <a:latin typeface="Cambria Math" panose="02040503050406030204" pitchFamily="18" charset="0"/>
                             </a:rPr>
-                            <m:t>𝐼</m:t>
+                            <m:t>𝑢</m:t>
                           </m:r>
                         </m:e>
                         <m:sub>
@@ -7403,22 +7462,22 @@
                       <m:sSub>
                         <m:sSubPr>
                           <m:ctrlPr>
-                            <a:rPr lang="it-IT" sz="2400" b="0" i="1" smtClean="0">
+                            <a:rPr lang="it-IT" sz="2400" i="1">
                               <a:latin typeface="Cambria Math" panose="02040503050406030204" pitchFamily="18" charset="0"/>
                             </a:rPr>
                           </m:ctrlPr>
                         </m:sSubPr>
                         <m:e>
                           <m:r>
-                            <a:rPr lang="it-IT" sz="2400" b="0" i="1" smtClean="0">
-                              <a:latin typeface="Cambria Math" panose="02040503050406030204" pitchFamily="18" charset="0"/>
-                            </a:rPr>
-                            <m:t>𝑢</m:t>
+                            <a:rPr lang="it-IT" sz="2400" i="1">
+                              <a:latin typeface="Cambria Math" panose="02040503050406030204" pitchFamily="18" charset="0"/>
+                            </a:rPr>
+                            <m:t>𝐼</m:t>
                           </m:r>
                         </m:e>
                         <m:sub>
                           <m:r>
-                            <a:rPr lang="it-IT" sz="2400" b="0" i="1" smtClean="0">
+                            <a:rPr lang="it-IT" sz="2400" i="1">
                               <a:latin typeface="Cambria Math" panose="02040503050406030204" pitchFamily="18" charset="0"/>
                             </a:rPr>
                             <m:t>2</m:t>
@@ -7519,7 +7578,7 @@
             </p:txBody>
           </p:sp>
         </mc:Choice>
-        <mc:Fallback xmlns="">
+        <mc:Fallback>
           <p:sp>
             <p:nvSpPr>
               <p:cNvPr id="4" name="CasellaDiTesto 3">
@@ -12849,8 +12908,8 @@
           </p:sp>
         </mc:Fallback>
       </mc:AlternateContent>
-      <mc:AlternateContent xmlns:mc="http://schemas.openxmlformats.org/markup-compatibility/2006" xmlns:a14="http://schemas.microsoft.com/office/drawing/2010/main">
-        <mc:Choice Requires="a14">
+      <mc:AlternateContent xmlns:mc="http://schemas.openxmlformats.org/markup-compatibility/2006">
+        <mc:Choice xmlns:a14="http://schemas.microsoft.com/office/drawing/2010/main" Requires="a14">
           <p:sp>
             <p:nvSpPr>
               <p:cNvPr id="89" name="CasellaDiTesto 88">
@@ -12887,10 +12946,7 @@
                     </m:oMathParaPr>
                     <m:oMath xmlns:m="http://schemas.openxmlformats.org/officeDocument/2006/math">
                       <m:r>
-                        <m:rPr>
-                          <m:sty m:val="p"/>
-                        </m:rPr>
-                        <a:rPr lang="it-IT" sz="1400" b="0" i="0" smtClean="0">
+                        <a:rPr lang="it-IT" sz="1400" i="1" smtClean="0">
                           <a:effectLst>
                             <a:outerShdw blurRad="38100" dist="38100" dir="2700000" algn="tl">
                               <a:srgbClr val="000000">
@@ -12900,7 +12956,7 @@
                           </a:effectLst>
                           <a:latin typeface="Cambria Math" panose="02040503050406030204" pitchFamily="18" charset="0"/>
                         </a:rPr>
-                        <m:t>b</m:t>
+                        <m:t>𝛽</m:t>
                       </m:r>
                       <m:sSub>
                         <m:sSubPr>
@@ -13053,7 +13109,7 @@
             </p:txBody>
           </p:sp>
         </mc:Choice>
-        <mc:Fallback xmlns="">
+        <mc:Fallback>
           <p:sp>
             <p:nvSpPr>
               <p:cNvPr id="89" name="CasellaDiTesto 88">
@@ -13079,7 +13135,7 @@
               <a:blipFill>
                 <a:blip r:embed="rId10"/>
                 <a:stretch>
-                  <a:fillRect b="-5357"/>
+                  <a:fillRect b="-8929"/>
                 </a:stretch>
               </a:blipFill>
             </p:spPr>
@@ -15388,23 +15444,19 @@
           <a:prstGeom prst="straightConnector1">
             <a:avLst/>
           </a:prstGeom>
-          <a:ln w="12700">
-            <a:solidFill>
-              <a:schemeClr val="tx1"/>
-            </a:solidFill>
-            <a:prstDash val="dash"/>
+          <a:ln>
             <a:tailEnd type="triangle"/>
           </a:ln>
         </p:spPr>
         <p:style>
           <a:lnRef idx="1">
-            <a:schemeClr val="accent1"/>
+            <a:schemeClr val="dk1"/>
           </a:lnRef>
           <a:fillRef idx="0">
-            <a:schemeClr val="accent1"/>
+            <a:schemeClr val="dk1"/>
           </a:fillRef>
           <a:effectRef idx="0">
-            <a:schemeClr val="accent1"/>
+            <a:schemeClr val="dk1"/>
           </a:effectRef>
           <a:fontRef idx="minor">
             <a:schemeClr val="tx1"/>
@@ -15639,8 +15691,8 @@
           </a:p>
         </p:txBody>
       </p:sp>
-      <mc:AlternateContent xmlns:mc="http://schemas.openxmlformats.org/markup-compatibility/2006">
-        <mc:Choice xmlns:a14="http://schemas.microsoft.com/office/drawing/2010/main" Requires="a14">
+      <mc:AlternateContent xmlns:mc="http://schemas.openxmlformats.org/markup-compatibility/2006" xmlns:a14="http://schemas.microsoft.com/office/drawing/2010/main">
+        <mc:Choice Requires="a14">
           <p:graphicFrame>
             <p:nvGraphicFramePr>
               <p:cNvPr id="5" name="Tabella 5">
@@ -15726,6 +15778,7 @@
                         <a:bodyPr/>
                         <a:lstStyle/>
                         <a:p>
+                          <a:pPr/>
                           <a14:m>
                             <m:oMathPara xmlns:m="http://schemas.openxmlformats.org/officeDocument/2006/math">
                               <m:oMathParaPr>
@@ -15790,6 +15843,7 @@
                         <a:bodyPr/>
                         <a:lstStyle/>
                         <a:p>
+                          <a:pPr/>
                           <a14:m>
                             <m:oMathPara xmlns:m="http://schemas.openxmlformats.org/officeDocument/2006/math">
                               <m:oMathParaPr>
@@ -15854,6 +15908,7 @@
                         <a:bodyPr/>
                         <a:lstStyle/>
                         <a:p>
+                          <a:pPr/>
                           <a14:m>
                             <m:oMathPara xmlns:m="http://schemas.openxmlformats.org/officeDocument/2006/math">
                               <m:oMathParaPr>
@@ -15918,6 +15973,7 @@
                         <a:bodyPr/>
                         <a:lstStyle/>
                         <a:p>
+                          <a:pPr/>
                           <a14:m>
                             <m:oMathPara xmlns:m="http://schemas.openxmlformats.org/officeDocument/2006/math">
                               <m:oMathParaPr>
@@ -15981,7 +16037,7 @@
             </a:graphic>
           </p:graphicFrame>
         </mc:Choice>
-        <mc:Fallback>
+        <mc:Fallback xmlns="">
           <p:graphicFrame>
             <p:nvGraphicFramePr>
               <p:cNvPr id="5" name="Tabella 5">

</xml_diff>